<commit_message>
added Caitlin's last modif to day 1 shit
git-svn-id: svn://svn.r-forge.r-project.org/svnroot/adegenet@1186 edb9625f-4e0d-4859-8d74-9fd3b1da38cb
</commit_message>
<xml_diff>
--- a/www/files/Leuven2014/Refresh-R.pptx
+++ b/www/files/Leuven2014/Refresh-R.pptx
@@ -23,8 +23,8 @@
     <p:sldId id="280" r:id="rId14"/>
     <p:sldId id="273" r:id="rId15"/>
     <p:sldId id="262" r:id="rId16"/>
-    <p:sldId id="276" r:id="rId17"/>
-    <p:sldId id="281" r:id="rId18"/>
+    <p:sldId id="281" r:id="rId17"/>
+    <p:sldId id="276" r:id="rId18"/>
     <p:sldId id="277" r:id="rId19"/>
     <p:sldId id="278" r:id="rId20"/>
   </p:sldIdLst>
@@ -742,6 +742,22 @@
           <a:bodyPr/>
           <a:lstStyle/>
           <a:p>
+            <a:r>
+              <a:rPr lang="en-GB" dirty="0" smtClean="0"/>
+              <a:t>*FYI:</a:t>
+            </a:r>
+            <a:r>
+              <a:rPr lang="en-GB" baseline="0" dirty="0" smtClean="0"/>
+              <a:t> </a:t>
+            </a:r>
+            <a:r>
+              <a:rPr lang="en-GB" dirty="0" err="1" smtClean="0"/>
+              <a:t>RCurl</a:t>
+            </a:r>
+            <a:r>
+              <a:rPr lang="en-GB" baseline="0" dirty="0" smtClean="0"/>
+              <a:t> is a package used to interact with websites, compose HTTP and FTP requests, upload and download from web pages, etc. </a:t>
+            </a:r>
             <a:endParaRPr lang="en-GB" dirty="0"/>
           </a:p>
         </p:txBody>
@@ -4319,7 +4335,7 @@
         </p:blipFill>
         <p:spPr>
           <a:xfrm>
-            <a:off x="6516216" y="5188875"/>
+            <a:off x="6287020" y="5081821"/>
             <a:ext cx="432048" cy="328357"/>
           </a:xfrm>
           <a:prstGeom prst="rect">
@@ -8026,32 +8042,24 @@
             </a:r>
             <a:r>
               <a:rPr lang="en-GB" dirty="0" err="1" smtClean="0"/>
-              <a:t>dapc</a:t>
+              <a:t>genind</a:t>
             </a:r>
             <a:r>
               <a:rPr lang="en-GB" dirty="0" smtClean="0"/>
-              <a:t>, network, </a:t>
+              <a:t>, </a:t>
+            </a:r>
+            <a:r>
+              <a:rPr lang="en-GB" dirty="0" err="1" smtClean="0"/>
+              <a:t>genpop</a:t>
+            </a:r>
+            <a:r>
+              <a:rPr lang="en-GB" dirty="0" smtClean="0"/>
+              <a:t>, </a:t>
             </a:r>
             <a:r>
               <a:rPr lang="en-GB" dirty="0" err="1" smtClean="0"/>
               <a:t>genlight</a:t>
             </a:r>
-            <a:r>
-              <a:rPr lang="en-GB" dirty="0" smtClean="0"/>
-              <a:t>, </a:t>
-            </a:r>
-            <a:r>
-              <a:rPr lang="en-GB" dirty="0" err="1" smtClean="0"/>
-              <a:t>genind</a:t>
-            </a:r>
-            <a:r>
-              <a:rPr lang="en-GB" dirty="0" smtClean="0"/>
-              <a:t>, </a:t>
-            </a:r>
-            <a:r>
-              <a:rPr lang="en-GB" dirty="0" err="1" smtClean="0"/>
-              <a:t>genpop</a:t>
-            </a:r>
             <a:endParaRPr lang="en-GB" dirty="0" smtClean="0"/>
           </a:p>
           <a:p>
@@ -8106,7 +8114,7 @@
                 </a:solidFill>
                 <a:latin typeface="Lucida Console" panose="020B0609040504020204" pitchFamily="49" charset="0"/>
               </a:rPr>
-              <a:t>”, x) </a:t>
+              <a:t>”, input) </a:t>
             </a:r>
             <a:r>
               <a:rPr lang="en-GB" dirty="0" smtClean="0">
@@ -8286,46 +8294,6 @@
                 <a:latin typeface="Lucida Console" panose="020B0609040504020204" pitchFamily="49" charset="0"/>
               </a:rPr>
               <a:t>retrieve all names of slots</a:t>
-            </a:r>
-            <a:endParaRPr lang="en-GB" dirty="0"/>
-          </a:p>
-          <a:p>
-            <a:pPr lvl="1"/>
-            <a:r>
-              <a:rPr lang="en-GB" dirty="0">
-                <a:solidFill>
-                  <a:srgbClr val="0070C0"/>
-                </a:solidFill>
-                <a:latin typeface="Lucida Console" panose="020B0609040504020204" pitchFamily="49" charset="0"/>
-              </a:rPr>
-              <a:t>&gt; </a:t>
-            </a:r>
-            <a:r>
-              <a:rPr lang="en-GB" dirty="0" err="1">
-                <a:solidFill>
-                  <a:srgbClr val="0070C0"/>
-                </a:solidFill>
-                <a:latin typeface="Lucida Console" panose="020B0609040504020204" pitchFamily="49" charset="0"/>
-              </a:rPr>
-              <a:t>showClass</a:t>
-            </a:r>
-            <a:r>
-              <a:rPr lang="en-GB" dirty="0">
-                <a:solidFill>
-                  <a:srgbClr val="0070C0"/>
-                </a:solidFill>
-                <a:latin typeface="Lucida Console" panose="020B0609040504020204" pitchFamily="49" charset="0"/>
-              </a:rPr>
-              <a:t>(x)</a:t>
-            </a:r>
-            <a:r>
-              <a:rPr lang="en-GB" dirty="0">
-                <a:solidFill>
-                  <a:srgbClr val="00B050"/>
-                </a:solidFill>
-                <a:latin typeface="Lucida Console" panose="020B0609040504020204" pitchFamily="49" charset="0"/>
-              </a:rPr>
-              <a:t># get class</a:t>
             </a:r>
             <a:endParaRPr lang="en-GB" dirty="0"/>
           </a:p>
@@ -9276,55 +9244,6 @@
                       </p:childTnLst>
                     </p:cTn>
                   </p:par>
-                  <p:par>
-                    <p:cTn id="67" fill="hold">
-                      <p:stCondLst>
-                        <p:cond delay="indefinite"/>
-                      </p:stCondLst>
-                      <p:childTnLst>
-                        <p:par>
-                          <p:cTn id="68" fill="hold">
-                            <p:stCondLst>
-                              <p:cond delay="0"/>
-                            </p:stCondLst>
-                            <p:childTnLst>
-                              <p:par>
-                                <p:cTn id="69" presetID="1" presetClass="entr" presetSubtype="0" fill="hold" nodeType="clickEffect">
-                                  <p:stCondLst>
-                                    <p:cond delay="0"/>
-                                  </p:stCondLst>
-                                  <p:childTnLst>
-                                    <p:set>
-                                      <p:cBhvr>
-                                        <p:cTn id="70" dur="1" fill="hold">
-                                          <p:stCondLst>
-                                            <p:cond delay="0"/>
-                                          </p:stCondLst>
-                                        </p:cTn>
-                                        <p:tgtEl>
-                                          <p:spTgt spid="3">
-                                            <p:txEl>
-                                              <p:pRg st="18" end="18"/>
-                                            </p:txEl>
-                                          </p:spTgt>
-                                        </p:tgtEl>
-                                        <p:attrNameLst>
-                                          <p:attrName>style.visibility</p:attrName>
-                                        </p:attrNameLst>
-                                      </p:cBhvr>
-                                      <p:to>
-                                        <p:strVal val="visible"/>
-                                      </p:to>
-                                    </p:set>
-                                  </p:childTnLst>
-                                </p:cTn>
-                              </p:par>
-                            </p:childTnLst>
-                          </p:cTn>
-                        </p:par>
-                      </p:childTnLst>
-                    </p:cTn>
-                  </p:par>
                 </p:childTnLst>
               </p:cTn>
               <p:prevCondLst>
@@ -9492,7 +9411,7 @@
               <a:rPr lang="en-GB" sz="4000" dirty="0" smtClean="0">
                 <a:latin typeface="+mj-lt"/>
               </a:rPr>
-              <a:t>Subsetting</a:t>
+              <a:t>Logical operators</a:t>
             </a:r>
             <a:endParaRPr lang="en-GB" sz="4000" dirty="0">
               <a:latin typeface="+mj-lt"/>
@@ -9510,10 +9429,15 @@
             <p:ph idx="1"/>
           </p:nvPr>
         </p:nvSpPr>
-        <p:spPr/>
+        <p:spPr>
+          <a:xfrm>
+            <a:off x="457200" y="1600200"/>
+            <a:ext cx="8363272" cy="4525963"/>
+          </a:xfrm>
+        </p:spPr>
         <p:txBody>
           <a:bodyPr>
-            <a:normAutofit fontScale="70000" lnSpcReduction="20000"/>
+            <a:normAutofit fontScale="85000" lnSpcReduction="10000"/>
           </a:bodyPr>
           <a:lstStyle/>
           <a:p>
@@ -9524,7 +9448,7 @@
                 </a:solidFill>
                 <a:latin typeface="Lucida Console" panose="020B0609040504020204" pitchFamily="49" charset="0"/>
               </a:rPr>
-              <a:t>&gt; y &lt;- x[1] </a:t>
+              <a:t>&gt; !x </a:t>
             </a:r>
             <a:r>
               <a:rPr lang="en-GB" dirty="0" smtClean="0">
@@ -9533,51 +9457,336 @@
                 </a:solidFill>
                 <a:latin typeface="Lucida Console" panose="020B0609040504020204" pitchFamily="49" charset="0"/>
               </a:rPr>
-              <a:t># get the 1</a:t>
-            </a:r>
-            <a:r>
-              <a:rPr lang="en-GB" baseline="30000" dirty="0" smtClean="0">
-                <a:solidFill>
-                  <a:srgbClr val="00B050"/>
-                </a:solidFill>
-                <a:latin typeface="Lucida Console" panose="020B0609040504020204" pitchFamily="49" charset="0"/>
-              </a:rPr>
-              <a:t>st</a:t>
-            </a:r>
-            <a:r>
-              <a:rPr lang="en-GB" dirty="0" smtClean="0">
-                <a:solidFill>
-                  <a:srgbClr val="00B050"/>
-                </a:solidFill>
-                <a:latin typeface="Lucida Console" panose="020B0609040504020204" pitchFamily="49" charset="0"/>
-              </a:rPr>
-              <a:t> element of a vector</a:t>
-            </a:r>
-            <a:endParaRPr lang="en-GB" dirty="0">
+              <a:t># NOT x</a:t>
+            </a:r>
+            <a:endParaRPr lang="en-GB" dirty="0" smtClean="0">
               <a:solidFill>
-                <a:srgbClr val="00B050"/>
+                <a:srgbClr val="0070C0"/>
               </a:solidFill>
               <a:latin typeface="Lucida Console" panose="020B0609040504020204" pitchFamily="49" charset="0"/>
             </a:endParaRPr>
           </a:p>
           <a:p>
             <a:r>
+              <a:rPr lang="en-GB" dirty="0" smtClean="0">
+                <a:solidFill>
+                  <a:srgbClr val="0070C0"/>
+                </a:solidFill>
+                <a:latin typeface="Lucida Console" panose="020B0609040504020204" pitchFamily="49" charset="0"/>
+              </a:rPr>
+              <a:t>&gt; x &amp; y </a:t>
+            </a:r>
+            <a:r>
+              <a:rPr lang="en-GB" dirty="0" smtClean="0">
+                <a:solidFill>
+                  <a:srgbClr val="00B050"/>
+                </a:solidFill>
+                <a:latin typeface="Lucida Console" panose="020B0609040504020204" pitchFamily="49" charset="0"/>
+              </a:rPr>
+              <a:t># x AND y (element-wise)</a:t>
+            </a:r>
+            <a:endParaRPr lang="en-GB" dirty="0" smtClean="0">
+              <a:solidFill>
+                <a:srgbClr val="0070C0"/>
+              </a:solidFill>
+              <a:latin typeface="Lucida Console" panose="020B0609040504020204" pitchFamily="49" charset="0"/>
+            </a:endParaRPr>
+          </a:p>
+          <a:p>
+            <a:r>
+              <a:rPr lang="en-GB" dirty="0" smtClean="0">
+                <a:solidFill>
+                  <a:srgbClr val="0070C0"/>
+                </a:solidFill>
+                <a:latin typeface="Lucida Console" panose="020B0609040504020204" pitchFamily="49" charset="0"/>
+              </a:rPr>
+              <a:t>&gt; x &amp;&amp; y </a:t>
+            </a:r>
+            <a:r>
+              <a:rPr lang="en-GB" dirty="0" smtClean="0">
+                <a:solidFill>
+                  <a:srgbClr val="00B050"/>
+                </a:solidFill>
+                <a:latin typeface="Lucida Console" panose="020B0609040504020204" pitchFamily="49" charset="0"/>
+              </a:rPr>
+              <a:t># x AND y (left-to-right, 1</a:t>
+            </a:r>
+            <a:r>
+              <a:rPr lang="en-GB" baseline="30000" dirty="0" smtClean="0">
+                <a:solidFill>
+                  <a:srgbClr val="00B050"/>
+                </a:solidFill>
+                <a:latin typeface="Lucida Console" panose="020B0609040504020204" pitchFamily="49" charset="0"/>
+              </a:rPr>
+              <a:t>st</a:t>
+            </a:r>
+            <a:r>
+              <a:rPr lang="en-GB" dirty="0" smtClean="0">
+                <a:solidFill>
+                  <a:srgbClr val="00B050"/>
+                </a:solidFill>
+                <a:latin typeface="Lucida Console" panose="020B0609040504020204" pitchFamily="49" charset="0"/>
+              </a:rPr>
+              <a:t> element only)</a:t>
+            </a:r>
+            <a:endParaRPr lang="en-GB" dirty="0" smtClean="0">
+              <a:solidFill>
+                <a:srgbClr val="0070C0"/>
+              </a:solidFill>
+              <a:latin typeface="Lucida Console" panose="020B0609040504020204" pitchFamily="49" charset="0"/>
+            </a:endParaRPr>
+          </a:p>
+          <a:p>
+            <a:r>
+              <a:rPr lang="en-GB" dirty="0" smtClean="0">
+                <a:solidFill>
+                  <a:srgbClr val="0070C0"/>
+                </a:solidFill>
+                <a:latin typeface="Lucida Console" panose="020B0609040504020204" pitchFamily="49" charset="0"/>
+              </a:rPr>
+              <a:t>&gt; x | y </a:t>
+            </a:r>
+            <a:r>
+              <a:rPr lang="en-GB" dirty="0" smtClean="0">
+                <a:solidFill>
+                  <a:srgbClr val="00B050"/>
+                </a:solidFill>
+                <a:latin typeface="Lucida Console" panose="020B0609040504020204" pitchFamily="49" charset="0"/>
+              </a:rPr>
+              <a:t># x OR y (element-wise)</a:t>
+            </a:r>
+            <a:endParaRPr lang="en-GB" dirty="0" smtClean="0">
+              <a:solidFill>
+                <a:srgbClr val="0070C0"/>
+              </a:solidFill>
+              <a:latin typeface="Lucida Console" panose="020B0609040504020204" pitchFamily="49" charset="0"/>
+            </a:endParaRPr>
+          </a:p>
+          <a:p>
+            <a:r>
+              <a:rPr lang="en-GB" dirty="0" smtClean="0">
+                <a:solidFill>
+                  <a:srgbClr val="0070C0"/>
+                </a:solidFill>
+                <a:latin typeface="Lucida Console" panose="020B0609040504020204" pitchFamily="49" charset="0"/>
+              </a:rPr>
+              <a:t>&gt; x || y </a:t>
+            </a:r>
+            <a:r>
+              <a:rPr lang="en-GB" dirty="0" smtClean="0">
+                <a:solidFill>
+                  <a:srgbClr val="00B050"/>
+                </a:solidFill>
+                <a:latin typeface="Lucida Console" panose="020B0609040504020204" pitchFamily="49" charset="0"/>
+              </a:rPr>
+              <a:t># x OR y (left-to-right, 1</a:t>
+            </a:r>
+            <a:r>
+              <a:rPr lang="en-GB" baseline="30000" dirty="0" smtClean="0">
+                <a:solidFill>
+                  <a:srgbClr val="00B050"/>
+                </a:solidFill>
+                <a:latin typeface="Lucida Console" panose="020B0609040504020204" pitchFamily="49" charset="0"/>
+              </a:rPr>
+              <a:t>st</a:t>
+            </a:r>
+            <a:r>
+              <a:rPr lang="en-GB" dirty="0" smtClean="0">
+                <a:solidFill>
+                  <a:srgbClr val="00B050"/>
+                </a:solidFill>
+                <a:latin typeface="Lucida Console" panose="020B0609040504020204" pitchFamily="49" charset="0"/>
+              </a:rPr>
+              <a:t> element only)</a:t>
+            </a:r>
+            <a:endParaRPr lang="en-GB" dirty="0" smtClean="0">
+              <a:solidFill>
+                <a:srgbClr val="0070C0"/>
+              </a:solidFill>
+              <a:latin typeface="Lucida Console" panose="020B0609040504020204" pitchFamily="49" charset="0"/>
+            </a:endParaRPr>
+          </a:p>
+          <a:p>
+            <a:r>
+              <a:rPr lang="en-GB" dirty="0" smtClean="0">
+                <a:solidFill>
+                  <a:srgbClr val="0070C0"/>
+                </a:solidFill>
+                <a:latin typeface="Lucida Console" panose="020B0609040504020204" pitchFamily="49" charset="0"/>
+              </a:rPr>
+              <a:t>&gt; x == y </a:t>
+            </a:r>
+            <a:r>
+              <a:rPr lang="en-GB" dirty="0" smtClean="0">
+                <a:solidFill>
+                  <a:srgbClr val="00B050"/>
+                </a:solidFill>
+                <a:latin typeface="Lucida Console" panose="020B0609040504020204" pitchFamily="49" charset="0"/>
+              </a:rPr>
+              <a:t># is x EQUAL to y? </a:t>
+            </a:r>
+            <a:r>
+              <a:rPr lang="en-GB" dirty="0" smtClean="0">
+                <a:solidFill>
+                  <a:srgbClr val="00B050"/>
+                </a:solidFill>
+                <a:latin typeface="Lucida Console" panose="020B0609040504020204" pitchFamily="49" charset="0"/>
+                <a:sym typeface="Wingdings" panose="05000000000000000000" pitchFamily="2" charset="2"/>
+              </a:rPr>
+              <a:t> TRUE/FALSE</a:t>
+            </a:r>
+            <a:endParaRPr lang="en-GB" dirty="0" smtClean="0">
+              <a:solidFill>
+                <a:srgbClr val="0070C0"/>
+              </a:solidFill>
+              <a:latin typeface="Lucida Console" panose="020B0609040504020204" pitchFamily="49" charset="0"/>
+            </a:endParaRPr>
+          </a:p>
+          <a:p>
+            <a:r>
+              <a:rPr lang="en-GB" dirty="0" smtClean="0">
+                <a:solidFill>
+                  <a:srgbClr val="0070C0"/>
+                </a:solidFill>
+                <a:latin typeface="Lucida Console" panose="020B0609040504020204" pitchFamily="49" charset="0"/>
+              </a:rPr>
+              <a:t>&gt; x %in% y </a:t>
+            </a:r>
+            <a:r>
+              <a:rPr lang="en-GB" dirty="0" smtClean="0">
+                <a:solidFill>
+                  <a:srgbClr val="00B050"/>
+                </a:solidFill>
+                <a:latin typeface="Lucida Console" panose="020B0609040504020204" pitchFamily="49" charset="0"/>
+              </a:rPr>
+              <a:t># element-wise: is </a:t>
+            </a:r>
+            <a:r>
+              <a:rPr lang="en-GB" dirty="0" err="1" smtClean="0">
+                <a:solidFill>
+                  <a:srgbClr val="00B050"/>
+                </a:solidFill>
+                <a:latin typeface="Lucida Console" panose="020B0609040504020204" pitchFamily="49" charset="0"/>
+              </a:rPr>
+              <a:t>x</a:t>
+            </a:r>
+            <a:r>
+              <a:rPr lang="en-GB" baseline="-25000" dirty="0" err="1" smtClean="0">
+                <a:solidFill>
+                  <a:srgbClr val="00B050"/>
+                </a:solidFill>
+                <a:latin typeface="Lucida Console" panose="020B0609040504020204" pitchFamily="49" charset="0"/>
+              </a:rPr>
+              <a:t>n</a:t>
+            </a:r>
+            <a:r>
+              <a:rPr lang="en-GB" dirty="0" smtClean="0">
+                <a:solidFill>
+                  <a:srgbClr val="00B050"/>
+                </a:solidFill>
+                <a:latin typeface="Lucida Console" panose="020B0609040504020204" pitchFamily="49" charset="0"/>
+              </a:rPr>
+              <a:t> in y? </a:t>
+            </a:r>
+            <a:r>
+              <a:rPr lang="en-GB" dirty="0" smtClean="0">
+                <a:solidFill>
+                  <a:srgbClr val="00B050"/>
+                </a:solidFill>
+                <a:latin typeface="Lucida Console" panose="020B0609040504020204" pitchFamily="49" charset="0"/>
+                <a:sym typeface="Wingdings" panose="05000000000000000000" pitchFamily="2" charset="2"/>
+              </a:rPr>
+              <a:t> </a:t>
+            </a:r>
+            <a:r>
+              <a:rPr lang="en-GB" dirty="0" smtClean="0">
+                <a:solidFill>
+                  <a:srgbClr val="00B050"/>
+                </a:solidFill>
+                <a:latin typeface="Lucida Console" panose="020B0609040504020204" pitchFamily="49" charset="0"/>
+              </a:rPr>
+              <a:t>TRUE/FALSE </a:t>
+            </a:r>
+            <a:endParaRPr lang="en-GB" dirty="0" smtClean="0">
+              <a:solidFill>
+                <a:srgbClr val="0070C0"/>
+              </a:solidFill>
+              <a:latin typeface="Lucida Console" panose="020B0609040504020204" pitchFamily="49" charset="0"/>
+            </a:endParaRPr>
+          </a:p>
+          <a:p>
+            <a:r>
+              <a:rPr lang="en-GB" dirty="0" smtClean="0">
+                <a:solidFill>
+                  <a:srgbClr val="0070C0"/>
+                </a:solidFill>
+                <a:latin typeface="Lucida Console" panose="020B0609040504020204" pitchFamily="49" charset="0"/>
+              </a:rPr>
+              <a:t>&gt; !x %in% y </a:t>
+            </a:r>
+            <a:r>
               <a:rPr lang="en-GB" dirty="0">
                 <a:solidFill>
-                  <a:srgbClr val="0070C0"/>
-                </a:solidFill>
-                <a:latin typeface="Lucida Console" panose="020B0609040504020204" pitchFamily="49" charset="0"/>
-              </a:rPr>
-              <a:t>&gt; y &lt;- </a:t>
+                  <a:srgbClr val="00B050"/>
+                </a:solidFill>
+                <a:latin typeface="Lucida Console" panose="020B0609040504020204" pitchFamily="49" charset="0"/>
+              </a:rPr>
+              <a:t># element-wise: is </a:t>
+            </a:r>
+            <a:r>
+              <a:rPr lang="en-GB" dirty="0" err="1">
+                <a:solidFill>
+                  <a:srgbClr val="00B050"/>
+                </a:solidFill>
+                <a:latin typeface="Lucida Console" panose="020B0609040504020204" pitchFamily="49" charset="0"/>
+              </a:rPr>
+              <a:t>x</a:t>
+            </a:r>
+            <a:r>
+              <a:rPr lang="en-GB" baseline="-25000" dirty="0" err="1">
+                <a:solidFill>
+                  <a:srgbClr val="00B050"/>
+                </a:solidFill>
+                <a:latin typeface="Lucida Console" panose="020B0609040504020204" pitchFamily="49" charset="0"/>
+              </a:rPr>
+              <a:t>n</a:t>
+            </a:r>
+            <a:r>
+              <a:rPr lang="en-GB" dirty="0">
+                <a:solidFill>
+                  <a:srgbClr val="00B050"/>
+                </a:solidFill>
+                <a:latin typeface="Lucida Console" panose="020B0609040504020204" pitchFamily="49" charset="0"/>
+              </a:rPr>
+              <a:t> </a:t>
             </a:r>
             <a:r>
               <a:rPr lang="en-GB" dirty="0" smtClean="0">
                 <a:solidFill>
-                  <a:srgbClr val="0070C0"/>
-                </a:solidFill>
-                <a:latin typeface="Lucida Console" panose="020B0609040504020204" pitchFamily="49" charset="0"/>
-              </a:rPr>
-              <a:t>x[c(1:10, 100), 7] </a:t>
+                  <a:srgbClr val="00B050"/>
+                </a:solidFill>
+                <a:latin typeface="Lucida Console" panose="020B0609040504020204" pitchFamily="49" charset="0"/>
+              </a:rPr>
+              <a:t>NOT in </a:t>
+            </a:r>
+            <a:r>
+              <a:rPr lang="en-GB" dirty="0">
+                <a:solidFill>
+                  <a:srgbClr val="00B050"/>
+                </a:solidFill>
+                <a:latin typeface="Lucida Console" panose="020B0609040504020204" pitchFamily="49" charset="0"/>
+              </a:rPr>
+              <a:t>y? </a:t>
+            </a:r>
+            <a:r>
+              <a:rPr lang="en-GB" dirty="0">
+                <a:solidFill>
+                  <a:srgbClr val="00B050"/>
+                </a:solidFill>
+                <a:latin typeface="Lucida Console" panose="020B0609040504020204" pitchFamily="49" charset="0"/>
+                <a:sym typeface="Wingdings" panose="05000000000000000000" pitchFamily="2" charset="2"/>
+              </a:rPr>
+              <a:t> </a:t>
             </a:r>
             <a:r>
               <a:rPr lang="en-GB" dirty="0" smtClean="0">
@@ -9585,26 +9794,81 @@
                   <a:srgbClr val="00B050"/>
                 </a:solidFill>
                 <a:latin typeface="Lucida Console" panose="020B0609040504020204" pitchFamily="49" charset="0"/>
-              </a:rPr>
-              <a:t># get the first 10 rows and the 100</a:t>
-            </a:r>
-            <a:r>
-              <a:rPr lang="en-GB" baseline="30000" dirty="0" smtClean="0">
+                <a:sym typeface="Wingdings" panose="05000000000000000000" pitchFamily="2" charset="2"/>
+              </a:rPr>
+              <a:t>T/F</a:t>
+            </a:r>
+            <a:r>
+              <a:rPr lang="en-GB" dirty="0" smtClean="0">
                 <a:solidFill>
                   <a:srgbClr val="00B050"/>
                 </a:solidFill>
                 <a:latin typeface="Lucida Console" panose="020B0609040504020204" pitchFamily="49" charset="0"/>
               </a:rPr>
-              <a:t>th</a:t>
-            </a:r>
+              <a:t> </a:t>
+            </a:r>
+            <a:endParaRPr lang="en-GB" dirty="0" smtClean="0">
+              <a:solidFill>
+                <a:srgbClr val="0070C0"/>
+              </a:solidFill>
+              <a:latin typeface="Lucida Console" panose="020B0609040504020204" pitchFamily="49" charset="0"/>
+            </a:endParaRPr>
+          </a:p>
+          <a:p>
             <a:r>
               <a:rPr lang="en-GB" dirty="0" smtClean="0">
                 <a:solidFill>
+                  <a:srgbClr val="0070C0"/>
+                </a:solidFill>
+                <a:latin typeface="Lucida Console" panose="020B0609040504020204" pitchFamily="49" charset="0"/>
+              </a:rPr>
+              <a:t>&gt; which(x </a:t>
+            </a:r>
+            <a:r>
+              <a:rPr lang="en-GB" dirty="0">
+                <a:solidFill>
+                  <a:srgbClr val="0070C0"/>
+                </a:solidFill>
+                <a:latin typeface="Lucida Console" panose="020B0609040504020204" pitchFamily="49" charset="0"/>
+              </a:rPr>
+              <a:t>%in% </a:t>
+            </a:r>
+            <a:r>
+              <a:rPr lang="en-GB" dirty="0" smtClean="0">
+                <a:solidFill>
+                  <a:srgbClr val="0070C0"/>
+                </a:solidFill>
+                <a:latin typeface="Lucida Console" panose="020B0609040504020204" pitchFamily="49" charset="0"/>
+              </a:rPr>
+              <a:t>y) </a:t>
+            </a:r>
+            <a:r>
+              <a:rPr lang="en-GB" dirty="0">
+                <a:solidFill>
                   <a:srgbClr val="00B050"/>
                 </a:solidFill>
                 <a:latin typeface="Lucida Console" panose="020B0609040504020204" pitchFamily="49" charset="0"/>
               </a:rPr>
-              <a:t> row of column 7</a:t>
+              <a:t># </a:t>
+            </a:r>
+            <a:r>
+              <a:rPr lang="en-GB" dirty="0">
+                <a:solidFill>
+                  <a:srgbClr val="00B050"/>
+                </a:solidFill>
+                <a:latin typeface="Lucida Console" panose="020B0609040504020204" pitchFamily="49" charset="0"/>
+                <a:sym typeface="Wingdings" panose="05000000000000000000" pitchFamily="2" charset="2"/>
+              </a:rPr>
+              <a:t> indices of the </a:t>
+            </a:r>
+            <a:r>
+              <a:rPr lang="en-GB" dirty="0">
+                <a:solidFill>
+                  <a:srgbClr val="00B050"/>
+                </a:solidFill>
+                <a:latin typeface="Lucida Console" panose="020B0609040504020204" pitchFamily="49" charset="0"/>
+              </a:rPr>
+              <a:t>x in y</a:t>
             </a:r>
             <a:endParaRPr lang="en-GB" dirty="0">
               <a:solidFill>
@@ -9621,7 +9885,16 @@
                 </a:solidFill>
                 <a:latin typeface="Lucida Console" panose="020B0609040504020204" pitchFamily="49" charset="0"/>
               </a:rPr>
-              <a:t>&gt; y &lt;- x[[1]] </a:t>
+              <a:t>&gt; all(x == 1)</a:t>
+            </a:r>
+            <a:r>
+              <a:rPr lang="en-GB" dirty="0">
+                <a:solidFill>
+                  <a:srgbClr val="00B050"/>
+                </a:solidFill>
+                <a:latin typeface="Lucida Console" panose="020B0609040504020204" pitchFamily="49" charset="0"/>
+              </a:rPr>
+              <a:t> </a:t>
             </a:r>
             <a:r>
               <a:rPr lang="en-GB" dirty="0" smtClean="0">
@@ -9630,172 +9903,9 @@
                 </a:solidFill>
                 <a:latin typeface="Lucida Console" panose="020B0609040504020204" pitchFamily="49" charset="0"/>
               </a:rPr>
-              <a:t># get the 1</a:t>
-            </a:r>
-            <a:r>
-              <a:rPr lang="en-GB" baseline="30000" dirty="0" smtClean="0">
-                <a:solidFill>
-                  <a:srgbClr val="00B050"/>
-                </a:solidFill>
-                <a:latin typeface="Lucida Console" panose="020B0609040504020204" pitchFamily="49" charset="0"/>
-              </a:rPr>
-              <a:t>st</a:t>
-            </a:r>
-            <a:r>
-              <a:rPr lang="en-GB" dirty="0" smtClean="0">
-                <a:solidFill>
-                  <a:srgbClr val="00B050"/>
-                </a:solidFill>
-                <a:latin typeface="Lucida Console" panose="020B0609040504020204" pitchFamily="49" charset="0"/>
-              </a:rPr>
-              <a:t> element of a list</a:t>
-            </a:r>
-            <a:endParaRPr lang="en-GB" dirty="0">
-              <a:solidFill>
-                <a:srgbClr val="00B050"/>
-              </a:solidFill>
-              <a:latin typeface="Lucida Console" panose="020B0609040504020204" pitchFamily="49" charset="0"/>
-            </a:endParaRPr>
-          </a:p>
-          <a:p>
-            <a:r>
-              <a:rPr lang="en-GB" dirty="0" smtClean="0">
-                <a:solidFill>
-                  <a:srgbClr val="0070C0"/>
-                </a:solidFill>
-                <a:latin typeface="Lucida Console" panose="020B0609040504020204" pitchFamily="49" charset="0"/>
-              </a:rPr>
-              <a:t>&gt; </a:t>
-            </a:r>
-            <a:r>
-              <a:rPr lang="en-GB" dirty="0">
-                <a:solidFill>
-                  <a:srgbClr val="0070C0"/>
-                </a:solidFill>
-                <a:latin typeface="Lucida Console" panose="020B0609040504020204" pitchFamily="49" charset="0"/>
-              </a:rPr>
-              <a:t>y </a:t>
-            </a:r>
-            <a:r>
-              <a:rPr lang="en-GB" dirty="0" smtClean="0">
-                <a:solidFill>
-                  <a:srgbClr val="0070C0"/>
-                </a:solidFill>
-                <a:latin typeface="Lucida Console" panose="020B0609040504020204" pitchFamily="49" charset="0"/>
-              </a:rPr>
-              <a:t>&lt;- x[[3]][[2]] </a:t>
-            </a:r>
-            <a:r>
-              <a:rPr lang="en-GB" dirty="0" smtClean="0">
-                <a:solidFill>
-                  <a:srgbClr val="00B050"/>
-                </a:solidFill>
-                <a:latin typeface="Lucida Console" panose="020B0609040504020204" pitchFamily="49" charset="0"/>
-              </a:rPr>
-              <a:t># get the 2</a:t>
-            </a:r>
-            <a:r>
-              <a:rPr lang="en-GB" baseline="30000" dirty="0" smtClean="0">
-                <a:solidFill>
-                  <a:srgbClr val="00B050"/>
-                </a:solidFill>
-                <a:latin typeface="Lucida Console" panose="020B0609040504020204" pitchFamily="49" charset="0"/>
-              </a:rPr>
-              <a:t>nd</a:t>
-            </a:r>
-            <a:r>
-              <a:rPr lang="en-GB" dirty="0">
-                <a:solidFill>
-                  <a:srgbClr val="00B050"/>
-                </a:solidFill>
-                <a:latin typeface="Lucida Console" panose="020B0609040504020204" pitchFamily="49" charset="0"/>
-              </a:rPr>
-              <a:t> </a:t>
-            </a:r>
-            <a:r>
-              <a:rPr lang="en-GB" dirty="0" smtClean="0">
-                <a:solidFill>
-                  <a:srgbClr val="00B050"/>
-                </a:solidFill>
-                <a:latin typeface="Lucida Console" panose="020B0609040504020204" pitchFamily="49" charset="0"/>
-              </a:rPr>
-              <a:t>item from within the 3</a:t>
-            </a:r>
-            <a:r>
-              <a:rPr lang="en-GB" baseline="30000" dirty="0" smtClean="0">
-                <a:solidFill>
-                  <a:srgbClr val="00B050"/>
-                </a:solidFill>
-                <a:latin typeface="Lucida Console" panose="020B0609040504020204" pitchFamily="49" charset="0"/>
-              </a:rPr>
-              <a:t>rd</a:t>
-            </a:r>
-            <a:r>
-              <a:rPr lang="en-GB" dirty="0" smtClean="0">
-                <a:solidFill>
-                  <a:srgbClr val="00B050"/>
-                </a:solidFill>
-                <a:latin typeface="Lucida Console" panose="020B0609040504020204" pitchFamily="49" charset="0"/>
-              </a:rPr>
-              <a:t> item of a list</a:t>
-            </a:r>
-          </a:p>
-          <a:p>
-            <a:r>
-              <a:rPr lang="en-GB" dirty="0">
-                <a:solidFill>
-                  <a:srgbClr val="0070C0"/>
-                </a:solidFill>
-                <a:latin typeface="Lucida Console" panose="020B0609040504020204" pitchFamily="49" charset="0"/>
-              </a:rPr>
-              <a:t>&gt; y &lt;- </a:t>
-            </a:r>
-            <a:r>
-              <a:rPr lang="en-GB" dirty="0" err="1" smtClean="0">
-                <a:solidFill>
-                  <a:srgbClr val="0070C0"/>
-                </a:solidFill>
-                <a:latin typeface="Lucida Console" panose="020B0609040504020204" pitchFamily="49" charset="0"/>
-              </a:rPr>
-              <a:t>x$loc.names</a:t>
-            </a:r>
-            <a:r>
-              <a:rPr lang="en-GB" dirty="0" smtClean="0">
-                <a:solidFill>
-                  <a:srgbClr val="0070C0"/>
-                </a:solidFill>
-                <a:latin typeface="Lucida Console" panose="020B0609040504020204" pitchFamily="49" charset="0"/>
-              </a:rPr>
-              <a:t> </a:t>
-            </a:r>
-            <a:r>
-              <a:rPr lang="en-GB" dirty="0" smtClean="0">
-                <a:solidFill>
-                  <a:srgbClr val="00B050"/>
-                </a:solidFill>
-                <a:latin typeface="Lucida Console" panose="020B0609040504020204" pitchFamily="49" charset="0"/>
-              </a:rPr>
-              <a:t># get the item/ slot of x named “</a:t>
-            </a:r>
-            <a:r>
-              <a:rPr lang="en-GB" dirty="0" err="1" smtClean="0">
-                <a:solidFill>
-                  <a:srgbClr val="00B050"/>
-                </a:solidFill>
-                <a:latin typeface="Lucida Console" panose="020B0609040504020204" pitchFamily="49" charset="0"/>
-              </a:rPr>
-              <a:t>loc.names</a:t>
-            </a:r>
-            <a:r>
-              <a:rPr lang="en-GB" dirty="0" smtClean="0">
-                <a:solidFill>
-                  <a:srgbClr val="00B050"/>
-                </a:solidFill>
-                <a:latin typeface="Lucida Console" panose="020B0609040504020204" pitchFamily="49" charset="0"/>
-              </a:rPr>
-              <a:t>”</a:t>
-            </a:r>
-            <a:endParaRPr lang="en-GB" dirty="0">
+              <a:t># are ALL elements of x EQUAL to 1?</a:t>
+            </a:r>
+            <a:endParaRPr lang="en-GB" dirty="0" smtClean="0">
               <a:solidFill>
                 <a:srgbClr val="0070C0"/>
               </a:solidFill>
@@ -9804,7 +9914,7 @@
           </a:p>
           <a:p>
             <a:r>
-              <a:rPr lang="en-GB" dirty="0">
+              <a:rPr lang="en-GB" smtClean="0">
                 <a:solidFill>
                   <a:srgbClr val="0070C0"/>
                 </a:solidFill>
@@ -9819,63 +9929,18 @@
                 </a:solidFill>
                 <a:latin typeface="Lucida Console" panose="020B0609040504020204" pitchFamily="49" charset="0"/>
               </a:rPr>
-              <a:t>y </a:t>
-            </a:r>
-            <a:r>
-              <a:rPr lang="en-GB" dirty="0">
-                <a:solidFill>
-                  <a:srgbClr val="0070C0"/>
-                </a:solidFill>
-                <a:latin typeface="Lucida Console" panose="020B0609040504020204" pitchFamily="49" charset="0"/>
-              </a:rPr>
-              <a:t>&lt;- x</a:t>
+              <a:t>any(x==1) </a:t>
             </a:r>
             <a:r>
               <a:rPr lang="en-GB" dirty="0" smtClean="0">
                 <a:solidFill>
-                  <a:srgbClr val="0070C0"/>
-                </a:solidFill>
-                <a:latin typeface="Lucida Console" panose="020B0609040504020204" pitchFamily="49" charset="0"/>
-              </a:rPr>
-              <a:t>[[“</a:t>
-            </a:r>
-            <a:r>
-              <a:rPr lang="en-GB" dirty="0" err="1" smtClean="0">
-                <a:solidFill>
-                  <a:srgbClr val="0070C0"/>
-                </a:solidFill>
-                <a:latin typeface="Lucida Console" panose="020B0609040504020204" pitchFamily="49" charset="0"/>
-              </a:rPr>
-              <a:t>loc.names</a:t>
-            </a:r>
-            <a:r>
-              <a:rPr lang="en-GB" dirty="0" smtClean="0">
-                <a:solidFill>
-                  <a:srgbClr val="0070C0"/>
-                </a:solidFill>
-                <a:latin typeface="Lucida Console" panose="020B0609040504020204" pitchFamily="49" charset="0"/>
-              </a:rPr>
-              <a:t>]] </a:t>
-            </a:r>
-            <a:r>
-              <a:rPr lang="en-GB" dirty="0">
-                <a:solidFill>
                   <a:srgbClr val="00B050"/>
                 </a:solidFill>
                 <a:latin typeface="Lucida Console" panose="020B0609040504020204" pitchFamily="49" charset="0"/>
               </a:rPr>
-              <a:t># </a:t>
-            </a:r>
-            <a:r>
-              <a:rPr lang="en-GB" dirty="0" smtClean="0">
-                <a:solidFill>
-                  <a:srgbClr val="00B050"/>
-                </a:solidFill>
-                <a:latin typeface="Lucida Console" panose="020B0609040504020204" pitchFamily="49" charset="0"/>
-              </a:rPr>
-              <a:t>same as above</a:t>
-            </a:r>
-            <a:endParaRPr lang="en-GB" dirty="0">
+              <a:t># are ANY elements of x EQUAL to 1?</a:t>
+            </a:r>
+            <a:endParaRPr lang="en-GB" dirty="0" smtClean="0">
               <a:solidFill>
                 <a:srgbClr val="0070C0"/>
               </a:solidFill>
@@ -9890,278 +9955,20 @@
                 </a:solidFill>
                 <a:latin typeface="Lucida Console" panose="020B0609040504020204" pitchFamily="49" charset="0"/>
               </a:rPr>
-              <a:t>&gt; nom &lt;- “</a:t>
-            </a:r>
-            <a:r>
-              <a:rPr lang="en-GB" dirty="0" err="1" smtClean="0">
-                <a:solidFill>
-                  <a:srgbClr val="0070C0"/>
-                </a:solidFill>
-                <a:latin typeface="Lucida Console" panose="020B0609040504020204" pitchFamily="49" charset="0"/>
-              </a:rPr>
-              <a:t>loc.names</a:t>
+              <a:t>&gt; which(x==1) </a:t>
             </a:r>
             <a:r>
               <a:rPr lang="en-GB" dirty="0" smtClean="0">
                 <a:solidFill>
-                  <a:srgbClr val="0070C0"/>
-                </a:solidFill>
-                <a:latin typeface="Lucida Console" panose="020B0609040504020204" pitchFamily="49" charset="0"/>
-              </a:rPr>
-              <a:t>”; y </a:t>
-            </a:r>
-            <a:r>
-              <a:rPr lang="en-GB" dirty="0">
-                <a:solidFill>
-                  <a:srgbClr val="0070C0"/>
-                </a:solidFill>
-                <a:latin typeface="Lucida Console" panose="020B0609040504020204" pitchFamily="49" charset="0"/>
-              </a:rPr>
-              <a:t>&lt;- </a:t>
-            </a:r>
-            <a:r>
-              <a:rPr lang="en-GB" dirty="0" smtClean="0">
-                <a:solidFill>
-                  <a:srgbClr val="0070C0"/>
-                </a:solidFill>
-                <a:latin typeface="Lucida Console" panose="020B0609040504020204" pitchFamily="49" charset="0"/>
-              </a:rPr>
-              <a:t>x[[nom]] </a:t>
-            </a:r>
-            <a:r>
-              <a:rPr lang="en-GB" dirty="0" smtClean="0">
-                <a:solidFill>
                   <a:srgbClr val="00B050"/>
                 </a:solidFill>
                 <a:latin typeface="Lucida Console" panose="020B0609040504020204" pitchFamily="49" charset="0"/>
               </a:rPr>
-              <a:t># same as above</a:t>
+              <a:t># which elements of x are EQUAL to 1?</a:t>
             </a:r>
             <a:endParaRPr lang="en-GB" dirty="0">
               <a:solidFill>
-                <a:srgbClr val="0070C0"/>
-              </a:solidFill>
-              <a:latin typeface="Lucida Console" panose="020B0609040504020204" pitchFamily="49" charset="0"/>
-            </a:endParaRPr>
-          </a:p>
-          <a:p>
-            <a:r>
-              <a:rPr lang="en-GB" dirty="0">
-                <a:solidFill>
-                  <a:srgbClr val="0070C0"/>
-                </a:solidFill>
-                <a:latin typeface="Lucida Console" panose="020B0609040504020204" pitchFamily="49" charset="0"/>
-              </a:rPr>
-              <a:t>&gt; y &lt;- </a:t>
-            </a:r>
-            <a:r>
-              <a:rPr lang="en-GB" dirty="0" smtClean="0">
-                <a:solidFill>
-                  <a:srgbClr val="0070C0"/>
-                </a:solidFill>
-                <a:latin typeface="Lucida Console" panose="020B0609040504020204" pitchFamily="49" charset="0"/>
-              </a:rPr>
-              <a:t>x[!is.na(x)] </a:t>
-            </a:r>
-            <a:r>
-              <a:rPr lang="en-GB" dirty="0" smtClean="0">
-                <a:solidFill>
-                  <a:srgbClr val="00B050"/>
-                </a:solidFill>
-                <a:latin typeface="Lucida Console" panose="020B0609040504020204" pitchFamily="49" charset="0"/>
-              </a:rPr>
-              <a:t># get all elements of x that are </a:t>
-            </a:r>
-            <a:r>
-              <a:rPr lang="en-GB" i="1" dirty="0" smtClean="0">
-                <a:solidFill>
-                  <a:srgbClr val="00B050"/>
-                </a:solidFill>
-                <a:latin typeface="Lucida Console" panose="020B0609040504020204" pitchFamily="49" charset="0"/>
-              </a:rPr>
-              <a:t>not </a:t>
-            </a:r>
-            <a:r>
-              <a:rPr lang="en-GB" dirty="0" smtClean="0">
-                <a:solidFill>
-                  <a:srgbClr val="00B050"/>
-                </a:solidFill>
-                <a:latin typeface="Lucida Console" panose="020B0609040504020204" pitchFamily="49" charset="0"/>
-              </a:rPr>
-              <a:t>NA</a:t>
-            </a:r>
-            <a:endParaRPr lang="en-GB" dirty="0">
-              <a:solidFill>
-                <a:srgbClr val="0070C0"/>
-              </a:solidFill>
-              <a:latin typeface="Lucida Console" panose="020B0609040504020204" pitchFamily="49" charset="0"/>
-            </a:endParaRPr>
-          </a:p>
-          <a:p>
-            <a:r>
-              <a:rPr lang="en-GB" dirty="0" smtClean="0">
-                <a:solidFill>
-                  <a:srgbClr val="0070C0"/>
-                </a:solidFill>
-                <a:latin typeface="Lucida Console" panose="020B0609040504020204" pitchFamily="49" charset="0"/>
-              </a:rPr>
-              <a:t>&gt; </a:t>
-            </a:r>
-            <a:r>
-              <a:rPr lang="en-GB" dirty="0">
-                <a:solidFill>
-                  <a:srgbClr val="0070C0"/>
-                </a:solidFill>
-                <a:latin typeface="Lucida Console" panose="020B0609040504020204" pitchFamily="49" charset="0"/>
-              </a:rPr>
-              <a:t>y &lt;- </a:t>
-            </a:r>
-            <a:r>
-              <a:rPr lang="en-GB" dirty="0" smtClean="0">
-                <a:solidFill>
-                  <a:srgbClr val="0070C0"/>
-                </a:solidFill>
-                <a:latin typeface="Lucida Console" panose="020B0609040504020204" pitchFamily="49" charset="0"/>
-              </a:rPr>
-              <a:t>x[-which(x &gt;= 20)] </a:t>
-            </a:r>
-            <a:r>
-              <a:rPr lang="en-GB" dirty="0" smtClean="0">
-                <a:solidFill>
-                  <a:srgbClr val="00B050"/>
-                </a:solidFill>
-                <a:latin typeface="Lucida Console" panose="020B0609040504020204" pitchFamily="49" charset="0"/>
-              </a:rPr>
-              <a:t># get all elements of x </a:t>
-            </a:r>
-            <a:r>
-              <a:rPr lang="en-GB" i="1" dirty="0" smtClean="0">
-                <a:solidFill>
-                  <a:srgbClr val="00B050"/>
-                </a:solidFill>
-                <a:latin typeface="Lucida Console" panose="020B0609040504020204" pitchFamily="49" charset="0"/>
-              </a:rPr>
-              <a:t>except</a:t>
-            </a:r>
-            <a:r>
-              <a:rPr lang="en-GB" dirty="0" smtClean="0">
-                <a:solidFill>
-                  <a:srgbClr val="00B050"/>
-                </a:solidFill>
-                <a:latin typeface="Lucida Console" panose="020B0609040504020204" pitchFamily="49" charset="0"/>
-              </a:rPr>
-              <a:t> those greater than or equal to 20</a:t>
-            </a:r>
-          </a:p>
-          <a:p>
-            <a:r>
-              <a:rPr lang="en-GB" dirty="0">
-                <a:solidFill>
-                  <a:srgbClr val="0070C0"/>
-                </a:solidFill>
-                <a:latin typeface="Lucida Console" panose="020B0609040504020204" pitchFamily="49" charset="0"/>
-              </a:rPr>
-              <a:t>&gt; y </a:t>
-            </a:r>
-            <a:r>
-              <a:rPr lang="en-GB" dirty="0" smtClean="0">
-                <a:solidFill>
-                  <a:srgbClr val="0070C0"/>
-                </a:solidFill>
-                <a:latin typeface="Lucida Console" panose="020B0609040504020204" pitchFamily="49" charset="0"/>
-              </a:rPr>
-              <a:t>&lt;- x[which(!x &gt;= 20)] </a:t>
-            </a:r>
-            <a:r>
-              <a:rPr lang="en-GB" dirty="0" smtClean="0">
-                <a:solidFill>
-                  <a:srgbClr val="00B050"/>
-                </a:solidFill>
-                <a:latin typeface="Lucida Console" panose="020B0609040504020204" pitchFamily="49" charset="0"/>
-              </a:rPr>
-              <a:t># same as above</a:t>
-            </a:r>
-            <a:endParaRPr lang="en-GB" dirty="0">
-              <a:solidFill>
-                <a:srgbClr val="0070C0"/>
-              </a:solidFill>
-              <a:latin typeface="Lucida Console" panose="020B0609040504020204" pitchFamily="49" charset="0"/>
-            </a:endParaRPr>
-          </a:p>
-          <a:p>
-            <a:r>
-              <a:rPr lang="en-GB" dirty="0">
-                <a:solidFill>
-                  <a:srgbClr val="0070C0"/>
-                </a:solidFill>
-                <a:latin typeface="Lucida Console" panose="020B0609040504020204" pitchFamily="49" charset="0"/>
-              </a:rPr>
-              <a:t>&gt; y &lt;- </a:t>
-            </a:r>
-            <a:r>
-              <a:rPr lang="en-GB" dirty="0" smtClean="0">
-                <a:solidFill>
-                  <a:srgbClr val="0070C0"/>
-                </a:solidFill>
-                <a:latin typeface="Lucida Console" panose="020B0609040504020204" pitchFamily="49" charset="0"/>
-              </a:rPr>
-              <a:t>subset(x, age &gt;= 20) </a:t>
-            </a:r>
-            <a:r>
-              <a:rPr lang="en-GB" dirty="0" smtClean="0">
-                <a:solidFill>
-                  <a:srgbClr val="00B050"/>
-                </a:solidFill>
-                <a:latin typeface="Lucida Console" panose="020B0609040504020204" pitchFamily="49" charset="0"/>
-              </a:rPr>
-              <a:t># same as above</a:t>
-            </a:r>
-            <a:endParaRPr lang="en-GB" dirty="0">
-              <a:solidFill>
-                <a:srgbClr val="0070C0"/>
-              </a:solidFill>
-              <a:latin typeface="Lucida Console" panose="020B0609040504020204" pitchFamily="49" charset="0"/>
-            </a:endParaRPr>
-          </a:p>
-          <a:p>
-            <a:r>
-              <a:rPr lang="en-GB" dirty="0">
-                <a:solidFill>
-                  <a:srgbClr val="0070C0"/>
-                </a:solidFill>
-                <a:latin typeface="Lucida Console" panose="020B0609040504020204" pitchFamily="49" charset="0"/>
-              </a:rPr>
-              <a:t>&gt; y &lt;- </a:t>
-            </a:r>
-            <a:r>
-              <a:rPr lang="en-GB" dirty="0" smtClean="0">
-                <a:solidFill>
-                  <a:srgbClr val="0070C0"/>
-                </a:solidFill>
-                <a:latin typeface="Lucida Console" panose="020B0609040504020204" pitchFamily="49" charset="0"/>
-              </a:rPr>
-              <a:t>sample(x, 50, replace = TRUE) </a:t>
-            </a:r>
-            <a:r>
-              <a:rPr lang="en-GB" dirty="0" smtClean="0">
-                <a:solidFill>
-                  <a:srgbClr val="00B050"/>
-                </a:solidFill>
-                <a:latin typeface="Lucida Console" panose="020B0609040504020204" pitchFamily="49" charset="0"/>
-              </a:rPr>
-              <a:t># get a random sample of 50 values from x, allowing for replacement</a:t>
-            </a:r>
-            <a:endParaRPr lang="en-GB" dirty="0">
-              <a:solidFill>
-                <a:srgbClr val="0070C0"/>
-              </a:solidFill>
-              <a:latin typeface="Lucida Console" panose="020B0609040504020204" pitchFamily="49" charset="0"/>
-            </a:endParaRPr>
-          </a:p>
-          <a:p>
-            <a:endParaRPr lang="en-GB" dirty="0">
-              <a:solidFill>
-                <a:srgbClr val="0070C0"/>
+                <a:srgbClr val="00B050"/>
               </a:solidFill>
               <a:latin typeface="Lucida Console" panose="020B0609040504020204" pitchFamily="49" charset="0"/>
             </a:endParaRPr>
@@ -10233,7 +10040,7 @@
     </p:spTree>
     <p:extLst>
       <p:ext uri="{BB962C8B-B14F-4D97-AF65-F5344CB8AC3E}">
-        <p14:creationId xmlns:p14="http://schemas.microsoft.com/office/powerpoint/2010/main" val="3866511665"/>
+        <p14:creationId xmlns:p14="http://schemas.microsoft.com/office/powerpoint/2010/main" val="2899459368"/>
       </p:ext>
     </p:extLst>
   </p:cSld>
@@ -10897,7 +10704,7 @@
               <a:rPr lang="en-GB" sz="4000" dirty="0" smtClean="0">
                 <a:latin typeface="+mj-lt"/>
               </a:rPr>
-              <a:t>Logical operators</a:t>
+              <a:t>Subsetting</a:t>
             </a:r>
             <a:endParaRPr lang="en-GB" sz="4000" dirty="0">
               <a:latin typeface="+mj-lt"/>
@@ -10915,15 +10722,10 @@
             <p:ph idx="1"/>
           </p:nvPr>
         </p:nvSpPr>
-        <p:spPr>
-          <a:xfrm>
-            <a:off x="457200" y="1600200"/>
-            <a:ext cx="8363272" cy="4525963"/>
-          </a:xfrm>
-        </p:spPr>
+        <p:spPr/>
         <p:txBody>
           <a:bodyPr>
-            <a:normAutofit fontScale="85000" lnSpcReduction="20000"/>
+            <a:normAutofit fontScale="70000" lnSpcReduction="20000"/>
           </a:bodyPr>
           <a:lstStyle/>
           <a:p>
@@ -10934,7 +10736,7 @@
                 </a:solidFill>
                 <a:latin typeface="Lucida Console" panose="020B0609040504020204" pitchFamily="49" charset="0"/>
               </a:rPr>
-              <a:t>&gt; !x </a:t>
+              <a:t>&gt; y &lt;- x[1] </a:t>
             </a:r>
             <a:r>
               <a:rPr lang="en-GB" dirty="0" smtClean="0">
@@ -10943,24 +10745,51 @@
                 </a:solidFill>
                 <a:latin typeface="Lucida Console" panose="020B0609040504020204" pitchFamily="49" charset="0"/>
               </a:rPr>
-              <a:t># NOT x</a:t>
-            </a:r>
-            <a:endParaRPr lang="en-GB" dirty="0" smtClean="0">
+              <a:t># get the 1</a:t>
+            </a:r>
+            <a:r>
+              <a:rPr lang="en-GB" baseline="30000" dirty="0" smtClean="0">
+                <a:solidFill>
+                  <a:srgbClr val="00B050"/>
+                </a:solidFill>
+                <a:latin typeface="Lucida Console" panose="020B0609040504020204" pitchFamily="49" charset="0"/>
+              </a:rPr>
+              <a:t>st</a:t>
+            </a:r>
+            <a:r>
+              <a:rPr lang="en-GB" dirty="0" smtClean="0">
+                <a:solidFill>
+                  <a:srgbClr val="00B050"/>
+                </a:solidFill>
+                <a:latin typeface="Lucida Console" panose="020B0609040504020204" pitchFamily="49" charset="0"/>
+              </a:rPr>
+              <a:t> element of a vector</a:t>
+            </a:r>
+            <a:endParaRPr lang="en-GB" dirty="0">
               <a:solidFill>
-                <a:srgbClr val="0070C0"/>
+                <a:srgbClr val="00B050"/>
               </a:solidFill>
               <a:latin typeface="Lucida Console" panose="020B0609040504020204" pitchFamily="49" charset="0"/>
             </a:endParaRPr>
           </a:p>
           <a:p>
             <a:r>
+              <a:rPr lang="en-GB" dirty="0">
+                <a:solidFill>
+                  <a:srgbClr val="0070C0"/>
+                </a:solidFill>
+                <a:latin typeface="Lucida Console" panose="020B0609040504020204" pitchFamily="49" charset="0"/>
+              </a:rPr>
+              <a:t>&gt; y &lt;- </a:t>
+            </a:r>
+            <a:r>
               <a:rPr lang="en-GB" dirty="0" smtClean="0">
                 <a:solidFill>
                   <a:srgbClr val="0070C0"/>
                 </a:solidFill>
                 <a:latin typeface="Lucida Console" panose="020B0609040504020204" pitchFamily="49" charset="0"/>
               </a:rPr>
-              <a:t>&gt; x &amp; y </a:t>
+              <a:t>x[c(1:10, 100), 7] </a:t>
             </a:r>
             <a:r>
               <a:rPr lang="en-GB" dirty="0" smtClean="0">
@@ -10969,374 +10798,25 @@
                 </a:solidFill>
                 <a:latin typeface="Lucida Console" panose="020B0609040504020204" pitchFamily="49" charset="0"/>
               </a:rPr>
-              <a:t># x AND y (element-wise)</a:t>
-            </a:r>
-            <a:endParaRPr lang="en-GB" dirty="0" smtClean="0">
-              <a:solidFill>
-                <a:srgbClr val="0070C0"/>
-              </a:solidFill>
-              <a:latin typeface="Lucida Console" panose="020B0609040504020204" pitchFamily="49" charset="0"/>
-            </a:endParaRPr>
-          </a:p>
-          <a:p>
+              <a:t># get the first 10 rows and the 100</a:t>
+            </a:r>
+            <a:r>
+              <a:rPr lang="en-GB" baseline="30000" dirty="0" smtClean="0">
+                <a:solidFill>
+                  <a:srgbClr val="00B050"/>
+                </a:solidFill>
+                <a:latin typeface="Lucida Console" panose="020B0609040504020204" pitchFamily="49" charset="0"/>
+              </a:rPr>
+              <a:t>th</a:t>
+            </a:r>
             <a:r>
               <a:rPr lang="en-GB" dirty="0" smtClean="0">
                 <a:solidFill>
-                  <a:srgbClr val="0070C0"/>
-                </a:solidFill>
-                <a:latin typeface="Lucida Console" panose="020B0609040504020204" pitchFamily="49" charset="0"/>
-              </a:rPr>
-              <a:t>&gt; x &amp;&amp; y </a:t>
-            </a:r>
-            <a:r>
-              <a:rPr lang="en-GB" dirty="0" smtClean="0">
-                <a:solidFill>
                   <a:srgbClr val="00B050"/>
                 </a:solidFill>
                 <a:latin typeface="Lucida Console" panose="020B0609040504020204" pitchFamily="49" charset="0"/>
               </a:rPr>
-              <a:t># x AND y (left-to-right, 1</a:t>
-            </a:r>
-            <a:r>
-              <a:rPr lang="en-GB" baseline="30000" dirty="0" smtClean="0">
-                <a:solidFill>
-                  <a:srgbClr val="00B050"/>
-                </a:solidFill>
-                <a:latin typeface="Lucida Console" panose="020B0609040504020204" pitchFamily="49" charset="0"/>
-              </a:rPr>
-              <a:t>st</a:t>
-            </a:r>
-            <a:r>
-              <a:rPr lang="en-GB" dirty="0" smtClean="0">
-                <a:solidFill>
-                  <a:srgbClr val="00B050"/>
-                </a:solidFill>
-                <a:latin typeface="Lucida Console" panose="020B0609040504020204" pitchFamily="49" charset="0"/>
-              </a:rPr>
-              <a:t> element only)</a:t>
-            </a:r>
-            <a:endParaRPr lang="en-GB" dirty="0" smtClean="0">
-              <a:solidFill>
-                <a:srgbClr val="0070C0"/>
-              </a:solidFill>
-              <a:latin typeface="Lucida Console" panose="020B0609040504020204" pitchFamily="49" charset="0"/>
-            </a:endParaRPr>
-          </a:p>
-          <a:p>
-            <a:r>
-              <a:rPr lang="en-GB" dirty="0" smtClean="0">
-                <a:solidFill>
-                  <a:srgbClr val="0070C0"/>
-                </a:solidFill>
-                <a:latin typeface="Lucida Console" panose="020B0609040504020204" pitchFamily="49" charset="0"/>
-              </a:rPr>
-              <a:t>&gt; x | y </a:t>
-            </a:r>
-            <a:r>
-              <a:rPr lang="en-GB" dirty="0" smtClean="0">
-                <a:solidFill>
-                  <a:srgbClr val="00B050"/>
-                </a:solidFill>
-                <a:latin typeface="Lucida Console" panose="020B0609040504020204" pitchFamily="49" charset="0"/>
-              </a:rPr>
-              <a:t># x OR y (element-wise)</a:t>
-            </a:r>
-            <a:endParaRPr lang="en-GB" dirty="0" smtClean="0">
-              <a:solidFill>
-                <a:srgbClr val="0070C0"/>
-              </a:solidFill>
-              <a:latin typeface="Lucida Console" panose="020B0609040504020204" pitchFamily="49" charset="0"/>
-            </a:endParaRPr>
-          </a:p>
-          <a:p>
-            <a:r>
-              <a:rPr lang="en-GB" dirty="0" smtClean="0">
-                <a:solidFill>
-                  <a:srgbClr val="0070C0"/>
-                </a:solidFill>
-                <a:latin typeface="Lucida Console" panose="020B0609040504020204" pitchFamily="49" charset="0"/>
-              </a:rPr>
-              <a:t>&gt; x || y </a:t>
-            </a:r>
-            <a:r>
-              <a:rPr lang="en-GB" dirty="0" smtClean="0">
-                <a:solidFill>
-                  <a:srgbClr val="00B050"/>
-                </a:solidFill>
-                <a:latin typeface="Lucida Console" panose="020B0609040504020204" pitchFamily="49" charset="0"/>
-              </a:rPr>
-              <a:t># x OR y (left-to-right, 1</a:t>
-            </a:r>
-            <a:r>
-              <a:rPr lang="en-GB" baseline="30000" dirty="0" smtClean="0">
-                <a:solidFill>
-                  <a:srgbClr val="00B050"/>
-                </a:solidFill>
-                <a:latin typeface="Lucida Console" panose="020B0609040504020204" pitchFamily="49" charset="0"/>
-              </a:rPr>
-              <a:t>st</a:t>
-            </a:r>
-            <a:r>
-              <a:rPr lang="en-GB" dirty="0" smtClean="0">
-                <a:solidFill>
-                  <a:srgbClr val="00B050"/>
-                </a:solidFill>
-                <a:latin typeface="Lucida Console" panose="020B0609040504020204" pitchFamily="49" charset="0"/>
-              </a:rPr>
-              <a:t> element only)</a:t>
-            </a:r>
-            <a:endParaRPr lang="en-GB" dirty="0" smtClean="0">
-              <a:solidFill>
-                <a:srgbClr val="0070C0"/>
-              </a:solidFill>
-              <a:latin typeface="Lucida Console" panose="020B0609040504020204" pitchFamily="49" charset="0"/>
-            </a:endParaRPr>
-          </a:p>
-          <a:p>
-            <a:r>
-              <a:rPr lang="en-GB" dirty="0" smtClean="0">
-                <a:solidFill>
-                  <a:srgbClr val="0070C0"/>
-                </a:solidFill>
-                <a:latin typeface="Lucida Console" panose="020B0609040504020204" pitchFamily="49" charset="0"/>
-              </a:rPr>
-              <a:t>&gt; x == y </a:t>
-            </a:r>
-            <a:r>
-              <a:rPr lang="en-GB" dirty="0" smtClean="0">
-                <a:solidFill>
-                  <a:srgbClr val="00B050"/>
-                </a:solidFill>
-                <a:latin typeface="Lucida Console" panose="020B0609040504020204" pitchFamily="49" charset="0"/>
-              </a:rPr>
-              <a:t># is x EQUAL to y? </a:t>
-            </a:r>
-            <a:r>
-              <a:rPr lang="en-GB" dirty="0" smtClean="0">
-                <a:solidFill>
-                  <a:srgbClr val="00B050"/>
-                </a:solidFill>
-                <a:latin typeface="Lucida Console" panose="020B0609040504020204" pitchFamily="49" charset="0"/>
-                <a:sym typeface="Wingdings" panose="05000000000000000000" pitchFamily="2" charset="2"/>
-              </a:rPr>
-              <a:t> TRUE/FALSE</a:t>
-            </a:r>
-            <a:endParaRPr lang="en-GB" dirty="0" smtClean="0">
-              <a:solidFill>
-                <a:srgbClr val="0070C0"/>
-              </a:solidFill>
-              <a:latin typeface="Lucida Console" panose="020B0609040504020204" pitchFamily="49" charset="0"/>
-            </a:endParaRPr>
-          </a:p>
-          <a:p>
-            <a:r>
-              <a:rPr lang="en-GB" dirty="0" smtClean="0">
-                <a:solidFill>
-                  <a:srgbClr val="0070C0"/>
-                </a:solidFill>
-                <a:latin typeface="Lucida Console" panose="020B0609040504020204" pitchFamily="49" charset="0"/>
-              </a:rPr>
-              <a:t>&gt; x %in% y </a:t>
-            </a:r>
-            <a:r>
-              <a:rPr lang="en-GB" dirty="0" smtClean="0">
-                <a:solidFill>
-                  <a:srgbClr val="00B050"/>
-                </a:solidFill>
-                <a:latin typeface="Lucida Console" panose="020B0609040504020204" pitchFamily="49" charset="0"/>
-              </a:rPr>
-              <a:t># element-wise: is </a:t>
-            </a:r>
-            <a:r>
-              <a:rPr lang="en-GB" dirty="0" err="1" smtClean="0">
-                <a:solidFill>
-                  <a:srgbClr val="00B050"/>
-                </a:solidFill>
-                <a:latin typeface="Lucida Console" panose="020B0609040504020204" pitchFamily="49" charset="0"/>
-              </a:rPr>
-              <a:t>x</a:t>
-            </a:r>
-            <a:r>
-              <a:rPr lang="en-GB" baseline="-25000" dirty="0" err="1" smtClean="0">
-                <a:solidFill>
-                  <a:srgbClr val="00B050"/>
-                </a:solidFill>
-                <a:latin typeface="Lucida Console" panose="020B0609040504020204" pitchFamily="49" charset="0"/>
-              </a:rPr>
-              <a:t>n</a:t>
-            </a:r>
-            <a:r>
-              <a:rPr lang="en-GB" dirty="0" smtClean="0">
-                <a:solidFill>
-                  <a:srgbClr val="00B050"/>
-                </a:solidFill>
-                <a:latin typeface="Lucida Console" panose="020B0609040504020204" pitchFamily="49" charset="0"/>
-              </a:rPr>
-              <a:t> in y? </a:t>
-            </a:r>
-            <a:r>
-              <a:rPr lang="en-GB" dirty="0" smtClean="0">
-                <a:solidFill>
-                  <a:srgbClr val="00B050"/>
-                </a:solidFill>
-                <a:latin typeface="Lucida Console" panose="020B0609040504020204" pitchFamily="49" charset="0"/>
-                <a:sym typeface="Wingdings" panose="05000000000000000000" pitchFamily="2" charset="2"/>
-              </a:rPr>
-              <a:t> </a:t>
-            </a:r>
-            <a:r>
-              <a:rPr lang="en-GB" dirty="0" smtClean="0">
-                <a:solidFill>
-                  <a:srgbClr val="00B050"/>
-                </a:solidFill>
-                <a:latin typeface="Lucida Console" panose="020B0609040504020204" pitchFamily="49" charset="0"/>
-              </a:rPr>
-              <a:t>TRUE/FALSE </a:t>
-            </a:r>
-            <a:endParaRPr lang="en-GB" dirty="0" smtClean="0">
-              <a:solidFill>
-                <a:srgbClr val="0070C0"/>
-              </a:solidFill>
-              <a:latin typeface="Lucida Console" panose="020B0609040504020204" pitchFamily="49" charset="0"/>
-            </a:endParaRPr>
-          </a:p>
-          <a:p>
-            <a:r>
-              <a:rPr lang="en-GB" dirty="0" smtClean="0">
-                <a:solidFill>
-                  <a:srgbClr val="0070C0"/>
-                </a:solidFill>
-                <a:latin typeface="Lucida Console" panose="020B0609040504020204" pitchFamily="49" charset="0"/>
-              </a:rPr>
-              <a:t>&gt; !x %in% y </a:t>
-            </a:r>
-            <a:r>
-              <a:rPr lang="en-GB" dirty="0">
-                <a:solidFill>
-                  <a:srgbClr val="00B050"/>
-                </a:solidFill>
-                <a:latin typeface="Lucida Console" panose="020B0609040504020204" pitchFamily="49" charset="0"/>
-              </a:rPr>
-              <a:t># element-wise: is </a:t>
-            </a:r>
-            <a:r>
-              <a:rPr lang="en-GB" dirty="0" err="1">
-                <a:solidFill>
-                  <a:srgbClr val="00B050"/>
-                </a:solidFill>
-                <a:latin typeface="Lucida Console" panose="020B0609040504020204" pitchFamily="49" charset="0"/>
-              </a:rPr>
-              <a:t>x</a:t>
-            </a:r>
-            <a:r>
-              <a:rPr lang="en-GB" baseline="-25000" dirty="0" err="1">
-                <a:solidFill>
-                  <a:srgbClr val="00B050"/>
-                </a:solidFill>
-                <a:latin typeface="Lucida Console" panose="020B0609040504020204" pitchFamily="49" charset="0"/>
-              </a:rPr>
-              <a:t>n</a:t>
-            </a:r>
-            <a:r>
-              <a:rPr lang="en-GB" dirty="0">
-                <a:solidFill>
-                  <a:srgbClr val="00B050"/>
-                </a:solidFill>
-                <a:latin typeface="Lucida Console" panose="020B0609040504020204" pitchFamily="49" charset="0"/>
-              </a:rPr>
-              <a:t> </a:t>
-            </a:r>
-            <a:r>
-              <a:rPr lang="en-GB" dirty="0" smtClean="0">
-                <a:solidFill>
-                  <a:srgbClr val="00B050"/>
-                </a:solidFill>
-                <a:latin typeface="Lucida Console" panose="020B0609040504020204" pitchFamily="49" charset="0"/>
-              </a:rPr>
-              <a:t>NOT in </a:t>
-            </a:r>
-            <a:r>
-              <a:rPr lang="en-GB" dirty="0">
-                <a:solidFill>
-                  <a:srgbClr val="00B050"/>
-                </a:solidFill>
-                <a:latin typeface="Lucida Console" panose="020B0609040504020204" pitchFamily="49" charset="0"/>
-              </a:rPr>
-              <a:t>y? </a:t>
-            </a:r>
-            <a:r>
-              <a:rPr lang="en-GB" dirty="0">
-                <a:solidFill>
-                  <a:srgbClr val="00B050"/>
-                </a:solidFill>
-                <a:latin typeface="Lucida Console" panose="020B0609040504020204" pitchFamily="49" charset="0"/>
-                <a:sym typeface="Wingdings" panose="05000000000000000000" pitchFamily="2" charset="2"/>
-              </a:rPr>
-              <a:t> </a:t>
-            </a:r>
-            <a:r>
-              <a:rPr lang="en-GB" dirty="0" smtClean="0">
-                <a:solidFill>
-                  <a:srgbClr val="00B050"/>
-                </a:solidFill>
-                <a:latin typeface="Lucida Console" panose="020B0609040504020204" pitchFamily="49" charset="0"/>
-                <a:sym typeface="Wingdings" panose="05000000000000000000" pitchFamily="2" charset="2"/>
-              </a:rPr>
-              <a:t>T/F</a:t>
-            </a:r>
-            <a:r>
-              <a:rPr lang="en-GB" dirty="0" smtClean="0">
-                <a:solidFill>
-                  <a:srgbClr val="00B050"/>
-                </a:solidFill>
-                <a:latin typeface="Lucida Console" panose="020B0609040504020204" pitchFamily="49" charset="0"/>
-              </a:rPr>
-              <a:t> </a:t>
-            </a:r>
-            <a:endParaRPr lang="en-GB" dirty="0" smtClean="0">
-              <a:solidFill>
-                <a:srgbClr val="0070C0"/>
-              </a:solidFill>
-              <a:latin typeface="Lucida Console" panose="020B0609040504020204" pitchFamily="49" charset="0"/>
-            </a:endParaRPr>
-          </a:p>
-          <a:p>
-            <a:r>
-              <a:rPr lang="en-GB" dirty="0">
-                <a:solidFill>
-                  <a:srgbClr val="0070C0"/>
-                </a:solidFill>
-                <a:latin typeface="Lucida Console" panose="020B0609040504020204" pitchFamily="49" charset="0"/>
-              </a:rPr>
-              <a:t>&gt; which(x %in% y)==TRUE </a:t>
-            </a:r>
-            <a:r>
-              <a:rPr lang="en-GB" dirty="0">
-                <a:solidFill>
-                  <a:srgbClr val="00B050"/>
-                </a:solidFill>
-                <a:latin typeface="Lucida Console" panose="020B0609040504020204" pitchFamily="49" charset="0"/>
-              </a:rPr>
-              <a:t># </a:t>
-            </a:r>
-            <a:r>
-              <a:rPr lang="en-GB" dirty="0">
-                <a:solidFill>
-                  <a:srgbClr val="00B050"/>
-                </a:solidFill>
-                <a:latin typeface="Lucida Console" panose="020B0609040504020204" pitchFamily="49" charset="0"/>
-                <a:sym typeface="Wingdings" panose="05000000000000000000" pitchFamily="2" charset="2"/>
-              </a:rPr>
-              <a:t> indices of the </a:t>
-            </a:r>
-            <a:r>
-              <a:rPr lang="en-GB" dirty="0">
-                <a:solidFill>
-                  <a:srgbClr val="00B050"/>
-                </a:solidFill>
-                <a:latin typeface="Lucida Console" panose="020B0609040504020204" pitchFamily="49" charset="0"/>
-              </a:rPr>
-              <a:t>x in y</a:t>
+              <a:t> row of column 7</a:t>
             </a:r>
             <a:endParaRPr lang="en-GB" dirty="0">
               <a:solidFill>
@@ -11353,7 +10833,51 @@
                 </a:solidFill>
                 <a:latin typeface="Lucida Console" panose="020B0609040504020204" pitchFamily="49" charset="0"/>
               </a:rPr>
-              <a:t>&gt; which(x </a:t>
+              <a:t>&gt; y &lt;- x[[1]] </a:t>
+            </a:r>
+            <a:r>
+              <a:rPr lang="en-GB" dirty="0" smtClean="0">
+                <a:solidFill>
+                  <a:srgbClr val="00B050"/>
+                </a:solidFill>
+                <a:latin typeface="Lucida Console" panose="020B0609040504020204" pitchFamily="49" charset="0"/>
+              </a:rPr>
+              <a:t># get the 1</a:t>
+            </a:r>
+            <a:r>
+              <a:rPr lang="en-GB" baseline="30000" dirty="0" smtClean="0">
+                <a:solidFill>
+                  <a:srgbClr val="00B050"/>
+                </a:solidFill>
+                <a:latin typeface="Lucida Console" panose="020B0609040504020204" pitchFamily="49" charset="0"/>
+              </a:rPr>
+              <a:t>st</a:t>
+            </a:r>
+            <a:r>
+              <a:rPr lang="en-GB" dirty="0" smtClean="0">
+                <a:solidFill>
+                  <a:srgbClr val="00B050"/>
+                </a:solidFill>
+                <a:latin typeface="Lucida Console" panose="020B0609040504020204" pitchFamily="49" charset="0"/>
+              </a:rPr>
+              <a:t> element of a list</a:t>
+            </a:r>
+            <a:endParaRPr lang="en-GB" dirty="0">
+              <a:solidFill>
+                <a:srgbClr val="00B050"/>
+              </a:solidFill>
+              <a:latin typeface="Lucida Console" panose="020B0609040504020204" pitchFamily="49" charset="0"/>
+            </a:endParaRPr>
+          </a:p>
+          <a:p>
+            <a:r>
+              <a:rPr lang="en-GB" dirty="0" smtClean="0">
+                <a:solidFill>
+                  <a:srgbClr val="0070C0"/>
+                </a:solidFill>
+                <a:latin typeface="Lucida Console" panose="020B0609040504020204" pitchFamily="49" charset="0"/>
+              </a:rPr>
+              <a:t>&gt; </a:t>
             </a:r>
             <a:r>
               <a:rPr lang="en-GB" dirty="0">
@@ -11362,7 +10886,7 @@
                 </a:solidFill>
                 <a:latin typeface="Lucida Console" panose="020B0609040504020204" pitchFamily="49" charset="0"/>
               </a:rPr>
-              <a:t>%in% </a:t>
+              <a:t>y </a:t>
             </a:r>
             <a:r>
               <a:rPr lang="en-GB" dirty="0" smtClean="0">
@@ -11371,7 +10895,7 @@
                 </a:solidFill>
                 <a:latin typeface="Lucida Console" panose="020B0609040504020204" pitchFamily="49" charset="0"/>
               </a:rPr>
-              <a:t>y) </a:t>
+              <a:t>&lt;- x[[3]][[2]] </a:t>
             </a:r>
             <a:r>
               <a:rPr lang="en-GB" dirty="0" smtClean="0">
@@ -11380,7 +10904,108 @@
                 </a:solidFill>
                 <a:latin typeface="Lucida Console" panose="020B0609040504020204" pitchFamily="49" charset="0"/>
               </a:rPr>
-              <a:t># same as above</a:t>
+              <a:t># get the 2</a:t>
+            </a:r>
+            <a:r>
+              <a:rPr lang="en-GB" baseline="30000" dirty="0" smtClean="0">
+                <a:solidFill>
+                  <a:srgbClr val="00B050"/>
+                </a:solidFill>
+                <a:latin typeface="Lucida Console" panose="020B0609040504020204" pitchFamily="49" charset="0"/>
+              </a:rPr>
+              <a:t>nd</a:t>
+            </a:r>
+            <a:r>
+              <a:rPr lang="en-GB" dirty="0">
+                <a:solidFill>
+                  <a:srgbClr val="00B050"/>
+                </a:solidFill>
+                <a:latin typeface="Lucida Console" panose="020B0609040504020204" pitchFamily="49" charset="0"/>
+              </a:rPr>
+              <a:t> </a:t>
+            </a:r>
+            <a:r>
+              <a:rPr lang="en-GB" dirty="0" smtClean="0">
+                <a:solidFill>
+                  <a:srgbClr val="00B050"/>
+                </a:solidFill>
+                <a:latin typeface="Lucida Console" panose="020B0609040504020204" pitchFamily="49" charset="0"/>
+              </a:rPr>
+              <a:t>item from within the 3</a:t>
+            </a:r>
+            <a:r>
+              <a:rPr lang="en-GB" baseline="30000" dirty="0" smtClean="0">
+                <a:solidFill>
+                  <a:srgbClr val="00B050"/>
+                </a:solidFill>
+                <a:latin typeface="Lucida Console" panose="020B0609040504020204" pitchFamily="49" charset="0"/>
+              </a:rPr>
+              <a:t>rd</a:t>
+            </a:r>
+            <a:r>
+              <a:rPr lang="en-GB" dirty="0" smtClean="0">
+                <a:solidFill>
+                  <a:srgbClr val="00B050"/>
+                </a:solidFill>
+                <a:latin typeface="Lucida Console" panose="020B0609040504020204" pitchFamily="49" charset="0"/>
+              </a:rPr>
+              <a:t> item of a list</a:t>
+            </a:r>
+          </a:p>
+          <a:p>
+            <a:r>
+              <a:rPr lang="en-GB" dirty="0">
+                <a:solidFill>
+                  <a:srgbClr val="0070C0"/>
+                </a:solidFill>
+                <a:latin typeface="Lucida Console" panose="020B0609040504020204" pitchFamily="49" charset="0"/>
+              </a:rPr>
+              <a:t>&gt; y &lt;- </a:t>
+            </a:r>
+            <a:r>
+              <a:rPr lang="en-GB" dirty="0" err="1" smtClean="0">
+                <a:solidFill>
+                  <a:srgbClr val="0070C0"/>
+                </a:solidFill>
+                <a:latin typeface="Lucida Console" panose="020B0609040504020204" pitchFamily="49" charset="0"/>
+              </a:rPr>
+              <a:t>x$loc.names</a:t>
+            </a:r>
+            <a:r>
+              <a:rPr lang="en-GB" dirty="0" smtClean="0">
+                <a:solidFill>
+                  <a:srgbClr val="0070C0"/>
+                </a:solidFill>
+                <a:latin typeface="Lucida Console" panose="020B0609040504020204" pitchFamily="49" charset="0"/>
+              </a:rPr>
+              <a:t> </a:t>
+            </a:r>
+            <a:r>
+              <a:rPr lang="en-GB" dirty="0" smtClean="0">
+                <a:solidFill>
+                  <a:srgbClr val="00B050"/>
+                </a:solidFill>
+                <a:latin typeface="Lucida Console" panose="020B0609040504020204" pitchFamily="49" charset="0"/>
+              </a:rPr>
+              <a:t># get the item/ slot of x named “</a:t>
+            </a:r>
+            <a:r>
+              <a:rPr lang="en-GB" dirty="0" err="1" smtClean="0">
+                <a:solidFill>
+                  <a:srgbClr val="00B050"/>
+                </a:solidFill>
+                <a:latin typeface="Lucida Console" panose="020B0609040504020204" pitchFamily="49" charset="0"/>
+              </a:rPr>
+              <a:t>loc.names</a:t>
+            </a:r>
+            <a:r>
+              <a:rPr lang="en-GB" dirty="0" smtClean="0">
+                <a:solidFill>
+                  <a:srgbClr val="00B050"/>
+                </a:solidFill>
+                <a:latin typeface="Lucida Console" panose="020B0609040504020204" pitchFamily="49" charset="0"/>
+              </a:rPr>
+              <a:t>”</a:t>
             </a:r>
             <a:endParaRPr lang="en-GB" dirty="0">
               <a:solidFill>
@@ -11391,22 +11016,67 @@
           </a:p>
           <a:p>
             <a:r>
+              <a:rPr lang="en-GB" dirty="0">
+                <a:solidFill>
+                  <a:srgbClr val="0070C0"/>
+                </a:solidFill>
+                <a:latin typeface="Lucida Console" panose="020B0609040504020204" pitchFamily="49" charset="0"/>
+              </a:rPr>
+              <a:t>&gt; </a:t>
+            </a:r>
+            <a:r>
               <a:rPr lang="en-GB" dirty="0" smtClean="0">
                 <a:solidFill>
                   <a:srgbClr val="0070C0"/>
                 </a:solidFill>
                 <a:latin typeface="Lucida Console" panose="020B0609040504020204" pitchFamily="49" charset="0"/>
               </a:rPr>
-              <a:t>&gt; all(x == 1)</a:t>
+              <a:t>y </a:t>
             </a:r>
             <a:r>
               <a:rPr lang="en-GB" dirty="0">
                 <a:solidFill>
+                  <a:srgbClr val="0070C0"/>
+                </a:solidFill>
+                <a:latin typeface="Lucida Console" panose="020B0609040504020204" pitchFamily="49" charset="0"/>
+              </a:rPr>
+              <a:t>&lt;- x</a:t>
+            </a:r>
+            <a:r>
+              <a:rPr lang="en-GB" dirty="0" smtClean="0">
+                <a:solidFill>
+                  <a:srgbClr val="0070C0"/>
+                </a:solidFill>
+                <a:latin typeface="Lucida Console" panose="020B0609040504020204" pitchFamily="49" charset="0"/>
+              </a:rPr>
+              <a:t>[[“</a:t>
+            </a:r>
+            <a:r>
+              <a:rPr lang="en-GB" dirty="0" err="1" smtClean="0">
+                <a:solidFill>
+                  <a:srgbClr val="0070C0"/>
+                </a:solidFill>
+                <a:latin typeface="Lucida Console" panose="020B0609040504020204" pitchFamily="49" charset="0"/>
+              </a:rPr>
+              <a:t>loc.names</a:t>
+            </a:r>
+            <a:r>
+              <a:rPr lang="en-GB" dirty="0" smtClean="0">
+                <a:solidFill>
+                  <a:srgbClr val="0070C0"/>
+                </a:solidFill>
+                <a:latin typeface="Lucida Console" panose="020B0609040504020204" pitchFamily="49" charset="0"/>
+              </a:rPr>
+              <a:t>]] </a:t>
+            </a:r>
+            <a:r>
+              <a:rPr lang="en-GB" dirty="0">
+                <a:solidFill>
                   <a:srgbClr val="00B050"/>
                 </a:solidFill>
                 <a:latin typeface="Lucida Console" panose="020B0609040504020204" pitchFamily="49" charset="0"/>
               </a:rPr>
-              <a:t> </a:t>
+              <a:t># </a:t>
             </a:r>
             <a:r>
               <a:rPr lang="en-GB" dirty="0" smtClean="0">
@@ -11415,9 +11085,9 @@
                 </a:solidFill>
                 <a:latin typeface="Lucida Console" panose="020B0609040504020204" pitchFamily="49" charset="0"/>
               </a:rPr>
-              <a:t># are ALL elements of x EQUAL to 1?</a:t>
-            </a:r>
-            <a:endParaRPr lang="en-GB" dirty="0" smtClean="0">
+              <a:t>same as above</a:t>
+            </a:r>
+            <a:endParaRPr lang="en-GB" dirty="0">
               <a:solidFill>
                 <a:srgbClr val="0070C0"/>
               </a:solidFill>
@@ -11432,38 +11102,54 @@
                 </a:solidFill>
                 <a:latin typeface="Lucida Console" panose="020B0609040504020204" pitchFamily="49" charset="0"/>
               </a:rPr>
-              <a:t>&gt; (!all(x==1))==TRUE </a:t>
+              <a:t>&gt; nom &lt;- “</a:t>
+            </a:r>
+            <a:r>
+              <a:rPr lang="en-GB" dirty="0" err="1" smtClean="0">
+                <a:solidFill>
+                  <a:srgbClr val="0070C0"/>
+                </a:solidFill>
+                <a:latin typeface="Lucida Console" panose="020B0609040504020204" pitchFamily="49" charset="0"/>
+              </a:rPr>
+              <a:t>loc.names</a:t>
             </a:r>
             <a:r>
               <a:rPr lang="en-GB" dirty="0" smtClean="0">
                 <a:solidFill>
+                  <a:srgbClr val="0070C0"/>
+                </a:solidFill>
+                <a:latin typeface="Lucida Console" panose="020B0609040504020204" pitchFamily="49" charset="0"/>
+              </a:rPr>
+              <a:t>”; y </a:t>
+            </a:r>
+            <a:r>
+              <a:rPr lang="en-GB" dirty="0">
+                <a:solidFill>
+                  <a:srgbClr val="0070C0"/>
+                </a:solidFill>
+                <a:latin typeface="Lucida Console" panose="020B0609040504020204" pitchFamily="49" charset="0"/>
+              </a:rPr>
+              <a:t>&lt;- </a:t>
+            </a:r>
+            <a:r>
+              <a:rPr lang="en-GB" dirty="0" smtClean="0">
+                <a:solidFill>
+                  <a:srgbClr val="0070C0"/>
+                </a:solidFill>
+                <a:latin typeface="Lucida Console" panose="020B0609040504020204" pitchFamily="49" charset="0"/>
+              </a:rPr>
+              <a:t>x[[nom]] </a:t>
+            </a:r>
+            <a:r>
+              <a:rPr lang="en-GB" dirty="0" smtClean="0">
+                <a:solidFill>
                   <a:srgbClr val="00B050"/>
                 </a:solidFill>
                 <a:latin typeface="Lucida Console" panose="020B0609040504020204" pitchFamily="49" charset="0"/>
               </a:rPr>
               <a:t># same as above</a:t>
             </a:r>
-          </a:p>
-          <a:p>
-            <a:r>
-              <a:rPr lang="en-GB" dirty="0" smtClean="0">
-                <a:solidFill>
-                  <a:srgbClr val="0070C0"/>
-                </a:solidFill>
-                <a:latin typeface="Lucida Console" panose="020B0609040504020204" pitchFamily="49" charset="0"/>
-              </a:rPr>
-              <a:t>&gt; any(x==1) </a:t>
-            </a:r>
-            <a:r>
-              <a:rPr lang="en-GB" dirty="0" smtClean="0">
-                <a:solidFill>
-                  <a:srgbClr val="00B050"/>
-                </a:solidFill>
-                <a:latin typeface="Lucida Console" panose="020B0609040504020204" pitchFamily="49" charset="0"/>
-              </a:rPr>
-              <a:t># are ANY elements of x EQUAL to 1?</a:t>
-            </a:r>
-            <a:endParaRPr lang="en-GB" dirty="0" smtClean="0">
+            <a:endParaRPr lang="en-GB" dirty="0">
               <a:solidFill>
                 <a:srgbClr val="0070C0"/>
               </a:solidFill>
@@ -11472,13 +11158,22 @@
           </a:p>
           <a:p>
             <a:r>
+              <a:rPr lang="en-GB" dirty="0">
+                <a:solidFill>
+                  <a:srgbClr val="0070C0"/>
+                </a:solidFill>
+                <a:latin typeface="Lucida Console" panose="020B0609040504020204" pitchFamily="49" charset="0"/>
+              </a:rPr>
+              <a:t>&gt; y &lt;- </a:t>
+            </a:r>
+            <a:r>
               <a:rPr lang="en-GB" dirty="0" smtClean="0">
                 <a:solidFill>
                   <a:srgbClr val="0070C0"/>
                 </a:solidFill>
                 <a:latin typeface="Lucida Console" panose="020B0609040504020204" pitchFamily="49" charset="0"/>
               </a:rPr>
-              <a:t>&gt; which(x==1) </a:t>
+              <a:t>x[!is.na(x)] </a:t>
             </a:r>
             <a:r>
               <a:rPr lang="en-GB" dirty="0" smtClean="0">
@@ -11487,11 +11182,198 @@
                 </a:solidFill>
                 <a:latin typeface="Lucida Console" panose="020B0609040504020204" pitchFamily="49" charset="0"/>
               </a:rPr>
-              <a:t># which elements of x are EQUAL to 1?</a:t>
+              <a:t># get all elements of x that are </a:t>
+            </a:r>
+            <a:r>
+              <a:rPr lang="en-GB" i="1" dirty="0" smtClean="0">
+                <a:solidFill>
+                  <a:srgbClr val="00B050"/>
+                </a:solidFill>
+                <a:latin typeface="Lucida Console" panose="020B0609040504020204" pitchFamily="49" charset="0"/>
+              </a:rPr>
+              <a:t>not </a:t>
+            </a:r>
+            <a:r>
+              <a:rPr lang="en-GB" dirty="0" smtClean="0">
+                <a:solidFill>
+                  <a:srgbClr val="00B050"/>
+                </a:solidFill>
+                <a:latin typeface="Lucida Console" panose="020B0609040504020204" pitchFamily="49" charset="0"/>
+              </a:rPr>
+              <a:t>NA</a:t>
             </a:r>
             <a:endParaRPr lang="en-GB" dirty="0">
               <a:solidFill>
-                <a:srgbClr val="00B050"/>
+                <a:srgbClr val="0070C0"/>
+              </a:solidFill>
+              <a:latin typeface="Lucida Console" panose="020B0609040504020204" pitchFamily="49" charset="0"/>
+            </a:endParaRPr>
+          </a:p>
+          <a:p>
+            <a:r>
+              <a:rPr lang="en-GB" dirty="0" smtClean="0">
+                <a:solidFill>
+                  <a:srgbClr val="0070C0"/>
+                </a:solidFill>
+                <a:latin typeface="Lucida Console" panose="020B0609040504020204" pitchFamily="49" charset="0"/>
+              </a:rPr>
+              <a:t>&gt; </a:t>
+            </a:r>
+            <a:r>
+              <a:rPr lang="en-GB" dirty="0">
+                <a:solidFill>
+                  <a:srgbClr val="0070C0"/>
+                </a:solidFill>
+                <a:latin typeface="Lucida Console" panose="020B0609040504020204" pitchFamily="49" charset="0"/>
+              </a:rPr>
+              <a:t>y &lt;- </a:t>
+            </a:r>
+            <a:r>
+              <a:rPr lang="en-GB" dirty="0" smtClean="0">
+                <a:solidFill>
+                  <a:srgbClr val="0070C0"/>
+                </a:solidFill>
+                <a:latin typeface="Lucida Console" panose="020B0609040504020204" pitchFamily="49" charset="0"/>
+              </a:rPr>
+              <a:t>x[-which(x &gt;= 20)] </a:t>
+            </a:r>
+            <a:r>
+              <a:rPr lang="en-GB" dirty="0" smtClean="0">
+                <a:solidFill>
+                  <a:srgbClr val="00B050"/>
+                </a:solidFill>
+                <a:latin typeface="Lucida Console" panose="020B0609040504020204" pitchFamily="49" charset="0"/>
+              </a:rPr>
+              <a:t># get all elements of x </a:t>
+            </a:r>
+            <a:r>
+              <a:rPr lang="en-GB" i="1" dirty="0" smtClean="0">
+                <a:solidFill>
+                  <a:srgbClr val="00B050"/>
+                </a:solidFill>
+                <a:latin typeface="Lucida Console" panose="020B0609040504020204" pitchFamily="49" charset="0"/>
+              </a:rPr>
+              <a:t>except</a:t>
+            </a:r>
+            <a:r>
+              <a:rPr lang="en-GB" dirty="0" smtClean="0">
+                <a:solidFill>
+                  <a:srgbClr val="00B050"/>
+                </a:solidFill>
+                <a:latin typeface="Lucida Console" panose="020B0609040504020204" pitchFamily="49" charset="0"/>
+              </a:rPr>
+              <a:t> those greater than or equal to 20</a:t>
+            </a:r>
+          </a:p>
+          <a:p>
+            <a:r>
+              <a:rPr lang="en-GB" dirty="0">
+                <a:solidFill>
+                  <a:srgbClr val="0070C0"/>
+                </a:solidFill>
+                <a:latin typeface="Lucida Console" panose="020B0609040504020204" pitchFamily="49" charset="0"/>
+              </a:rPr>
+              <a:t>&gt; y </a:t>
+            </a:r>
+            <a:r>
+              <a:rPr lang="en-GB" dirty="0" smtClean="0">
+                <a:solidFill>
+                  <a:srgbClr val="0070C0"/>
+                </a:solidFill>
+                <a:latin typeface="Lucida Console" panose="020B0609040504020204" pitchFamily="49" charset="0"/>
+              </a:rPr>
+              <a:t>&lt;- x[which(!x &gt;= 20)] </a:t>
+            </a:r>
+            <a:r>
+              <a:rPr lang="en-GB" dirty="0" smtClean="0">
+                <a:solidFill>
+                  <a:srgbClr val="00B050"/>
+                </a:solidFill>
+                <a:latin typeface="Lucida Console" panose="020B0609040504020204" pitchFamily="49" charset="0"/>
+              </a:rPr>
+              <a:t># same as above</a:t>
+            </a:r>
+            <a:endParaRPr lang="en-GB" dirty="0">
+              <a:solidFill>
+                <a:srgbClr val="0070C0"/>
+              </a:solidFill>
+              <a:latin typeface="Lucida Console" panose="020B0609040504020204" pitchFamily="49" charset="0"/>
+            </a:endParaRPr>
+          </a:p>
+          <a:p>
+            <a:r>
+              <a:rPr lang="en-GB" dirty="0">
+                <a:solidFill>
+                  <a:srgbClr val="0070C0"/>
+                </a:solidFill>
+                <a:latin typeface="Lucida Console" panose="020B0609040504020204" pitchFamily="49" charset="0"/>
+              </a:rPr>
+              <a:t>&gt; y &lt;- </a:t>
+            </a:r>
+            <a:r>
+              <a:rPr lang="en-GB" dirty="0" smtClean="0">
+                <a:solidFill>
+                  <a:srgbClr val="0070C0"/>
+                </a:solidFill>
+                <a:latin typeface="Lucida Console" panose="020B0609040504020204" pitchFamily="49" charset="0"/>
+              </a:rPr>
+              <a:t>subset(x, age &gt;= 20) </a:t>
+            </a:r>
+            <a:r>
+              <a:rPr lang="en-GB" dirty="0" smtClean="0">
+                <a:solidFill>
+                  <a:srgbClr val="00B050"/>
+                </a:solidFill>
+                <a:latin typeface="Lucida Console" panose="020B0609040504020204" pitchFamily="49" charset="0"/>
+              </a:rPr>
+              <a:t># same as above</a:t>
+            </a:r>
+            <a:endParaRPr lang="en-GB" dirty="0">
+              <a:solidFill>
+                <a:srgbClr val="0070C0"/>
+              </a:solidFill>
+              <a:latin typeface="Lucida Console" panose="020B0609040504020204" pitchFamily="49" charset="0"/>
+            </a:endParaRPr>
+          </a:p>
+          <a:p>
+            <a:r>
+              <a:rPr lang="en-GB" dirty="0">
+                <a:solidFill>
+                  <a:srgbClr val="0070C0"/>
+                </a:solidFill>
+                <a:latin typeface="Lucida Console" panose="020B0609040504020204" pitchFamily="49" charset="0"/>
+              </a:rPr>
+              <a:t>&gt; y &lt;- </a:t>
+            </a:r>
+            <a:r>
+              <a:rPr lang="en-GB" dirty="0" smtClean="0">
+                <a:solidFill>
+                  <a:srgbClr val="0070C0"/>
+                </a:solidFill>
+                <a:latin typeface="Lucida Console" panose="020B0609040504020204" pitchFamily="49" charset="0"/>
+              </a:rPr>
+              <a:t>sample(x, 50, replace = TRUE) </a:t>
+            </a:r>
+            <a:r>
+              <a:rPr lang="en-GB" dirty="0" smtClean="0">
+                <a:solidFill>
+                  <a:srgbClr val="00B050"/>
+                </a:solidFill>
+                <a:latin typeface="Lucida Console" panose="020B0609040504020204" pitchFamily="49" charset="0"/>
+              </a:rPr>
+              <a:t># get a random sample of 50 values from x, allowing for replacement</a:t>
+            </a:r>
+            <a:endParaRPr lang="en-GB" dirty="0">
+              <a:solidFill>
+                <a:srgbClr val="0070C0"/>
+              </a:solidFill>
+              <a:latin typeface="Lucida Console" panose="020B0609040504020204" pitchFamily="49" charset="0"/>
+            </a:endParaRPr>
+          </a:p>
+          <a:p>
+            <a:endParaRPr lang="en-GB" dirty="0">
+              <a:solidFill>
+                <a:srgbClr val="0070C0"/>
               </a:solidFill>
               <a:latin typeface="Lucida Console" panose="020B0609040504020204" pitchFamily="49" charset="0"/>
             </a:endParaRPr>
@@ -11563,7 +11445,7 @@
     </p:spTree>
     <p:extLst>
       <p:ext uri="{BB962C8B-B14F-4D97-AF65-F5344CB8AC3E}">
-        <p14:creationId xmlns:p14="http://schemas.microsoft.com/office/powerpoint/2010/main" val="2899459368"/>
+        <p14:creationId xmlns:p14="http://schemas.microsoft.com/office/powerpoint/2010/main" val="3866511665"/>
       </p:ext>
     </p:extLst>
   </p:cSld>
@@ -12166,104 +12048,6 @@
                       </p:childTnLst>
                     </p:cTn>
                   </p:par>
-                  <p:par>
-                    <p:cTn id="51" fill="hold">
-                      <p:stCondLst>
-                        <p:cond delay="indefinite"/>
-                      </p:stCondLst>
-                      <p:childTnLst>
-                        <p:par>
-                          <p:cTn id="52" fill="hold">
-                            <p:stCondLst>
-                              <p:cond delay="0"/>
-                            </p:stCondLst>
-                            <p:childTnLst>
-                              <p:par>
-                                <p:cTn id="53" presetID="1" presetClass="entr" presetSubtype="0" fill="hold" nodeType="clickEffect">
-                                  <p:stCondLst>
-                                    <p:cond delay="0"/>
-                                  </p:stCondLst>
-                                  <p:childTnLst>
-                                    <p:set>
-                                      <p:cBhvr>
-                                        <p:cTn id="54" dur="1" fill="hold">
-                                          <p:stCondLst>
-                                            <p:cond delay="0"/>
-                                          </p:stCondLst>
-                                        </p:cTn>
-                                        <p:tgtEl>
-                                          <p:spTgt spid="3">
-                                            <p:txEl>
-                                              <p:pRg st="12" end="12"/>
-                                            </p:txEl>
-                                          </p:spTgt>
-                                        </p:tgtEl>
-                                        <p:attrNameLst>
-                                          <p:attrName>style.visibility</p:attrName>
-                                        </p:attrNameLst>
-                                      </p:cBhvr>
-                                      <p:to>
-                                        <p:strVal val="visible"/>
-                                      </p:to>
-                                    </p:set>
-                                  </p:childTnLst>
-                                </p:cTn>
-                              </p:par>
-                            </p:childTnLst>
-                          </p:cTn>
-                        </p:par>
-                      </p:childTnLst>
-                    </p:cTn>
-                  </p:par>
-                  <p:par>
-                    <p:cTn id="55" fill="hold">
-                      <p:stCondLst>
-                        <p:cond delay="indefinite"/>
-                      </p:stCondLst>
-                      <p:childTnLst>
-                        <p:par>
-                          <p:cTn id="56" fill="hold">
-                            <p:stCondLst>
-                              <p:cond delay="0"/>
-                            </p:stCondLst>
-                            <p:childTnLst>
-                              <p:par>
-                                <p:cTn id="57" presetID="1" presetClass="entr" presetSubtype="0" fill="hold" nodeType="clickEffect">
-                                  <p:stCondLst>
-                                    <p:cond delay="0"/>
-                                  </p:stCondLst>
-                                  <p:childTnLst>
-                                    <p:set>
-                                      <p:cBhvr>
-                                        <p:cTn id="58" dur="1" fill="hold">
-                                          <p:stCondLst>
-                                            <p:cond delay="0"/>
-                                          </p:stCondLst>
-                                        </p:cTn>
-                                        <p:tgtEl>
-                                          <p:spTgt spid="3">
-                                            <p:txEl>
-                                              <p:pRg st="13" end="13"/>
-                                            </p:txEl>
-                                          </p:spTgt>
-                                        </p:tgtEl>
-                                        <p:attrNameLst>
-                                          <p:attrName>style.visibility</p:attrName>
-                                        </p:attrNameLst>
-                                      </p:cBhvr>
-                                      <p:to>
-                                        <p:strVal val="visible"/>
-                                      </p:to>
-                                    </p:set>
-                                  </p:childTnLst>
-                                </p:cTn>
-                              </p:par>
-                            </p:childTnLst>
-                          </p:cTn>
-                        </p:par>
-                      </p:childTnLst>
-                    </p:cTn>
-                  </p:par>
                 </p:childTnLst>
               </p:cTn>
               <p:prevCondLst>
@@ -12631,11 +12415,11 @@
             <a:pPr lvl="1"/>
             <a:r>
               <a:rPr lang="en-GB" dirty="0" smtClean="0"/>
-              <a:t>Subsetting, l</a:t>
+              <a:t>Logical operations</a:t>
             </a:r>
             <a:r>
               <a:rPr lang="en-GB" dirty="0" smtClean="0"/>
-              <a:t>ogical operations</a:t>
+              <a:t>, subsetting</a:t>
             </a:r>
           </a:p>
           <a:p>
@@ -17270,10 +17054,19 @@
                 </a:solidFill>
                 <a:latin typeface="Lucida Console" panose="020B0609040504020204" pitchFamily="49" charset="0"/>
               </a:rPr>
-              <a:t>&gt; ?</a:t>
-            </a:r>
-            <a:r>
-              <a:rPr lang="en-GB" sz="2000" dirty="0" err="1" smtClean="0">
+              <a:t>&gt; </a:t>
+            </a:r>
+            <a:r>
+              <a:rPr lang="en-GB" sz="2000" b="1" dirty="0" smtClean="0">
+                <a:solidFill>
+                  <a:srgbClr val="0070C0"/>
+                </a:solidFill>
+                <a:latin typeface="Lucida Console" panose="020B0609040504020204" pitchFamily="49" charset="0"/>
+              </a:rPr>
+              <a:t>?</a:t>
+            </a:r>
+            <a:r>
+              <a:rPr lang="en-GB" sz="2000" b="1" dirty="0" err="1" smtClean="0">
                 <a:solidFill>
                   <a:srgbClr val="0070C0"/>
                 </a:solidFill>
@@ -17282,7 +17075,7 @@
               <a:t>fn</a:t>
             </a:r>
             <a:r>
-              <a:rPr lang="en-GB" sz="2000" dirty="0" smtClean="0">
+              <a:rPr lang="en-GB" sz="2000" b="1" dirty="0" smtClean="0">
                 <a:solidFill>
                   <a:srgbClr val="0070C0"/>
                 </a:solidFill>
@@ -17713,21 +17506,58 @@
           <a:p>
             <a:pPr lvl="2"/>
             <a:r>
+              <a:rPr lang="en-GB" sz="2000" b="1" i="1" dirty="0" smtClean="0"/>
+              <a:t>R-sig-</a:t>
+            </a:r>
+            <a:r>
+              <a:rPr lang="en-GB" sz="2000" b="1" i="1" dirty="0" err="1" smtClean="0"/>
+              <a:t>phylo</a:t>
+            </a:r>
+            <a:r>
+              <a:rPr lang="en-GB" sz="2000" b="1" i="1" dirty="0" smtClean="0"/>
+              <a:t>:</a:t>
+            </a:r>
+            <a:r>
               <a:rPr lang="en-GB" sz="2000" dirty="0" smtClean="0"/>
-              <a:t>R-sig-</a:t>
-            </a:r>
-            <a:r>
-              <a:rPr lang="en-GB" sz="2000" dirty="0" err="1" smtClean="0"/>
-              <a:t>phylo</a:t>
+              <a:t> </a:t>
+            </a:r>
+            <a:r>
+              <a:rPr lang="en-GB" sz="2000" dirty="0">
+                <a:hlinkClick r:id="rId9"/>
+              </a:rPr>
+              <a:t>https://</a:t>
+            </a:r>
+            <a:r>
+              <a:rPr lang="en-GB" sz="2000" dirty="0" smtClean="0">
+                <a:hlinkClick r:id="rId9"/>
+              </a:rPr>
+              <a:t>stat.ethz.ch/mailman/listinfo/r-sig-phylo</a:t>
             </a:r>
             <a:endParaRPr lang="en-GB" sz="2000" dirty="0" smtClean="0"/>
           </a:p>
           <a:p>
             <a:pPr lvl="2"/>
             <a:r>
-              <a:rPr lang="en-GB" sz="2000" dirty="0" smtClean="0"/>
-              <a:t>R-sig-genetics</a:t>
-            </a:r>
+              <a:rPr lang="en-GB" sz="2000" b="1" i="1" dirty="0"/>
+              <a:t>R-sig-genetics:</a:t>
+            </a:r>
+            <a:r>
+              <a:rPr lang="en-GB" sz="2000" dirty="0"/>
+              <a:t> </a:t>
+            </a:r>
+            <a:r>
+              <a:rPr lang="en-GB" sz="2000" dirty="0">
+                <a:hlinkClick r:id="rId10"/>
+              </a:rPr>
+              <a:t>https://</a:t>
+            </a:r>
+            <a:r>
+              <a:rPr lang="en-GB" sz="2000" dirty="0" smtClean="0">
+                <a:hlinkClick r:id="rId10"/>
+              </a:rPr>
+              <a:t>stat.ethz.ch/mailman/listinfo/r-sig-genetics</a:t>
+            </a:r>
+            <a:endParaRPr lang="en-GB" sz="2000" dirty="0" smtClean="0"/>
           </a:p>
           <a:p>
             <a:pPr lvl="1"/>

</xml_diff>